<commit_message>
Fixed pptx formating issues
</commit_message>
<xml_diff>
--- a/slides/kumuluzee.pptx
+++ b/slides/kumuluzee.pptx
@@ -2,23 +2,23 @@
 <file path=ppt/presentation.xml><?xml version="1.0" encoding="utf-8"?>
 <p:presentation xmlns:a="http://schemas.openxmlformats.org/drawingml/2006/main" xmlns:r="http://schemas.openxmlformats.org/officeDocument/2006/relationships" xmlns:p="http://schemas.openxmlformats.org/presentationml/2006/main">
   <p:sldMasterIdLst>
-    <p:sldMasterId id="2147483648" r:id="rId5"/>
+    <p:sldMasterId id="2147483648" r:id="rId1"/>
   </p:sldMasterIdLst>
   <p:notesMasterIdLst>
-    <p:notesMasterId r:id="rId7"/>
+    <p:notesMasterId r:id="rId13"/>
   </p:notesMasterIdLst>
   <p:sldIdLst>
-    <p:sldId id="256" r:id="rId8"/>
-    <p:sldId id="257" r:id="rId9"/>
-    <p:sldId id="258" r:id="rId10"/>
-    <p:sldId id="259" r:id="rId11"/>
-    <p:sldId id="260" r:id="rId12"/>
-    <p:sldId id="261" r:id="rId13"/>
-    <p:sldId id="262" r:id="rId14"/>
-    <p:sldId id="263" r:id="rId15"/>
-    <p:sldId id="264" r:id="rId16"/>
-    <p:sldId id="265" r:id="rId17"/>
-    <p:sldId id="266" r:id="rId18"/>
+    <p:sldId id="256" r:id="rId2"/>
+    <p:sldId id="257" r:id="rId3"/>
+    <p:sldId id="258" r:id="rId4"/>
+    <p:sldId id="259" r:id="rId5"/>
+    <p:sldId id="260" r:id="rId6"/>
+    <p:sldId id="261" r:id="rId7"/>
+    <p:sldId id="262" r:id="rId8"/>
+    <p:sldId id="263" r:id="rId9"/>
+    <p:sldId id="264" r:id="rId10"/>
+    <p:sldId id="265" r:id="rId11"/>
+    <p:sldId id="266" r:id="rId12"/>
   </p:sldIdLst>
   <p:sldSz cx="24384000" cy="13716000"/>
   <p:notesSz cx="6858000" cy="9144000"/>
@@ -38,7 +38,7 @@
       <a:buFontTx/>
       <a:buNone/>
       <a:tabLst/>
-      <a:defRPr b="0" baseline="0" cap="none" i="0" spc="0" strike="noStrike" sz="1800" u="none" kumimoji="0" normalizeH="0">
+      <a:defRPr kumimoji="0" sz="1800" b="0" i="0" u="none" strike="noStrike" cap="none" spc="0" normalizeH="0" baseline="0">
         <a:ln>
           <a:noFill/>
         </a:ln>
@@ -64,7 +64,7 @@
       <a:buFontTx/>
       <a:buNone/>
       <a:tabLst/>
-      <a:defRPr b="0" baseline="0" cap="none" i="0" spc="0" strike="noStrike" sz="5000" u="none" kumimoji="0" normalizeH="0">
+      <a:defRPr kumimoji="0" sz="5000" b="0" i="0" u="none" strike="noStrike" cap="none" spc="0" normalizeH="0" baseline="0">
         <a:ln>
           <a:noFill/>
         </a:ln>
@@ -94,7 +94,7 @@
       <a:buFontTx/>
       <a:buNone/>
       <a:tabLst/>
-      <a:defRPr b="0" baseline="0" cap="none" i="0" spc="0" strike="noStrike" sz="5000" u="none" kumimoji="0" normalizeH="0">
+      <a:defRPr kumimoji="0" sz="5000" b="0" i="0" u="none" strike="noStrike" cap="none" spc="0" normalizeH="0" baseline="0">
         <a:ln>
           <a:noFill/>
         </a:ln>
@@ -124,7 +124,7 @@
       <a:buFontTx/>
       <a:buNone/>
       <a:tabLst/>
-      <a:defRPr b="0" baseline="0" cap="none" i="0" spc="0" strike="noStrike" sz="5000" u="none" kumimoji="0" normalizeH="0">
+      <a:defRPr kumimoji="0" sz="5000" b="0" i="0" u="none" strike="noStrike" cap="none" spc="0" normalizeH="0" baseline="0">
         <a:ln>
           <a:noFill/>
         </a:ln>
@@ -154,7 +154,7 @@
       <a:buFontTx/>
       <a:buNone/>
       <a:tabLst/>
-      <a:defRPr b="0" baseline="0" cap="none" i="0" spc="0" strike="noStrike" sz="5000" u="none" kumimoji="0" normalizeH="0">
+      <a:defRPr kumimoji="0" sz="5000" b="0" i="0" u="none" strike="noStrike" cap="none" spc="0" normalizeH="0" baseline="0">
         <a:ln>
           <a:noFill/>
         </a:ln>
@@ -184,7 +184,7 @@
       <a:buFontTx/>
       <a:buNone/>
       <a:tabLst/>
-      <a:defRPr b="0" baseline="0" cap="none" i="0" spc="0" strike="noStrike" sz="5000" u="none" kumimoji="0" normalizeH="0">
+      <a:defRPr kumimoji="0" sz="5000" b="0" i="0" u="none" strike="noStrike" cap="none" spc="0" normalizeH="0" baseline="0">
         <a:ln>
           <a:noFill/>
         </a:ln>
@@ -214,7 +214,7 @@
       <a:buFontTx/>
       <a:buNone/>
       <a:tabLst/>
-      <a:defRPr b="0" baseline="0" cap="none" i="0" spc="0" strike="noStrike" sz="5000" u="none" kumimoji="0" normalizeH="0">
+      <a:defRPr kumimoji="0" sz="5000" b="0" i="0" u="none" strike="noStrike" cap="none" spc="0" normalizeH="0" baseline="0">
         <a:ln>
           <a:noFill/>
         </a:ln>
@@ -244,7 +244,7 @@
       <a:buFontTx/>
       <a:buNone/>
       <a:tabLst/>
-      <a:defRPr b="0" baseline="0" cap="none" i="0" spc="0" strike="noStrike" sz="5000" u="none" kumimoji="0" normalizeH="0">
+      <a:defRPr kumimoji="0" sz="5000" b="0" i="0" u="none" strike="noStrike" cap="none" spc="0" normalizeH="0" baseline="0">
         <a:ln>
           <a:noFill/>
         </a:ln>
@@ -274,7 +274,7 @@
       <a:buFontTx/>
       <a:buNone/>
       <a:tabLst/>
-      <a:defRPr b="0" baseline="0" cap="none" i="0" spc="0" strike="noStrike" sz="5000" u="none" kumimoji="0" normalizeH="0">
+      <a:defRPr kumimoji="0" sz="5000" b="0" i="0" u="none" strike="noStrike" cap="none" spc="0" normalizeH="0" baseline="0">
         <a:ln>
           <a:noFill/>
         </a:ln>
@@ -304,7 +304,7 @@
       <a:buFontTx/>
       <a:buNone/>
       <a:tabLst/>
-      <a:defRPr b="0" baseline="0" cap="none" i="0" spc="0" strike="noStrike" sz="5000" u="none" kumimoji="0" normalizeH="0">
+      <a:defRPr kumimoji="0" sz="5000" b="0" i="0" u="none" strike="noStrike" cap="none" spc="0" normalizeH="0" baseline="0">
         <a:ln>
           <a:noFill/>
         </a:ln>
@@ -323,13 +323,14 @@
 </p:presentation>
 </file>
 
-<file path=ppt/commentAuthors.xml><?xml version="1.0" encoding="utf-8"?>
-<p:cmAuthorLst xmlns:a="http://schemas.openxmlformats.org/drawingml/2006/main" xmlns:r="http://schemas.openxmlformats.org/officeDocument/2006/relationships" xmlns:p="http://schemas.openxmlformats.org/presentationml/2006/main"/>
-</file>
-
 <file path=ppt/notesMasters/notesMaster1.xml><?xml version="1.0" encoding="utf-8"?>
 <p:notesMaster xmlns:a="http://schemas.openxmlformats.org/drawingml/2006/main" xmlns:r="http://schemas.openxmlformats.org/officeDocument/2006/relationships" xmlns:p="http://schemas.openxmlformats.org/presentationml/2006/main">
   <p:cSld>
+    <p:bg>
+      <p:bgRef idx="1001">
+        <a:schemeClr val="bg1"/>
+      </p:bgRef>
+    </p:bg>
     <p:spTree>
       <p:nvGrpSpPr>
         <p:cNvPr id="1" name=""/>
@@ -347,7 +348,9 @@
       <p:sp>
         <p:nvSpPr>
           <p:cNvPr id="116" name="Shape 116"/>
-          <p:cNvSpPr/>
+          <p:cNvSpPr>
+            <a:spLocks noGrp="1" noRot="1" noChangeAspect="1"/>
+          </p:cNvSpPr>
           <p:nvPr>
             <p:ph type="sldImg"/>
           </p:nvPr>
@@ -365,14 +368,16 @@
           <a:bodyPr/>
           <a:lstStyle/>
           <a:p>
-            <a:pPr/>
+            <a:endParaRPr/>
           </a:p>
         </p:txBody>
       </p:sp>
       <p:sp>
         <p:nvSpPr>
           <p:cNvPr id="117" name="Shape 117"/>
-          <p:cNvSpPr/>
+          <p:cNvSpPr>
+            <a:spLocks noGrp="1"/>
+          </p:cNvSpPr>
           <p:nvPr>
             <p:ph type="body" sz="quarter" idx="1"/>
           </p:nvPr>
@@ -390,11 +395,16 @@
           <a:bodyPr/>
           <a:lstStyle/>
           <a:p>
-            <a:pPr/>
+            <a:endParaRPr/>
           </a:p>
         </p:txBody>
       </p:sp>
     </p:spTree>
+    <p:extLst>
+      <p:ext uri="{BB962C8B-B14F-4D97-AF65-F5344CB8AC3E}">
+        <p14:creationId xmlns:p14="http://schemas.microsoft.com/office/powerpoint/2010/main" val="432392457"/>
+      </p:ext>
+    </p:extLst>
   </p:cSld>
   <p:clrMap bg1="lt1" tx1="dk1" bg2="lt2" tx2="dk2" accent1="accent1" accent2="accent2" accent3="accent3" accent4="accent4" accent5="accent5" accent6="accent6" hlink="hlink" folHlink="folHlink"/>
   <p:notesStyle>
@@ -475,7 +485,7 @@
 </file>
 
 <file path=ppt/notesSlides/notesSlide1.xml><?xml version="1.0" encoding="utf-8"?>
-<p:notes xmlns:a="http://schemas.openxmlformats.org/drawingml/2006/main" xmlns:r="http://schemas.openxmlformats.org/officeDocument/2006/relationships" xmlns:p="http://schemas.openxmlformats.org/presentationml/2006/main" showMasterSp="1" showMasterPhAnim="1">
+<p:notes xmlns:a="http://schemas.openxmlformats.org/drawingml/2006/main" xmlns:r="http://schemas.openxmlformats.org/officeDocument/2006/relationships" xmlns:p="http://schemas.openxmlformats.org/presentationml/2006/main">
   <p:cSld>
     <p:spTree>
       <p:nvGrpSpPr>
@@ -494,12 +504,18 @@
       <p:sp>
         <p:nvSpPr>
           <p:cNvPr id="123" name="Shape 123"/>
-          <p:cNvSpPr/>
+          <p:cNvSpPr>
+            <a:spLocks noGrp="1" noRot="1" noChangeAspect="1"/>
+          </p:cNvSpPr>
           <p:nvPr>
             <p:ph type="sldImg"/>
           </p:nvPr>
         </p:nvSpPr>
         <p:spPr>
+          <a:xfrm>
+            <a:off x="381000" y="685800"/>
+            <a:ext cx="6096000" cy="3429000"/>
+          </a:xfrm>
           <a:prstGeom prst="rect">
             <a:avLst/>
           </a:prstGeom>
@@ -508,14 +524,16 @@
           <a:bodyPr/>
           <a:lstStyle/>
           <a:p>
-            <a:pPr/>
+            <a:endParaRPr/>
           </a:p>
         </p:txBody>
       </p:sp>
       <p:sp>
         <p:nvSpPr>
           <p:cNvPr id="124" name="Shape 124"/>
-          <p:cNvSpPr/>
+          <p:cNvSpPr>
+            <a:spLocks noGrp="1"/>
+          </p:cNvSpPr>
           <p:nvPr>
             <p:ph type="body" sz="quarter" idx="1"/>
           </p:nvPr>
@@ -529,7 +547,6 @@
           <a:bodyPr/>
           <a:lstStyle/>
           <a:p>
-            <a:pPr/>
             <a:r>
               <a:t>KumuluzEE is a lightweight open source framework that enables developers to create applications following the microservice pattern using standard Java EE APIs. Instead of deploying applications to a centralized application server, KumuluzEE creates standalone and independent executable archives (JARs) that are self-sustained and contain everything they need to function. These archives can then be run everywhere standard Java runs. This eliminates the need for an application server, which also makes the microservice more light.  The framework is completely modular and as such allows everyone to add any component they wish to implement.</a:t>
             </a:r>
@@ -537,6 +554,11 @@
         </p:txBody>
       </p:sp>
     </p:spTree>
+    <p:extLst>
+      <p:ext uri="{BB962C8B-B14F-4D97-AF65-F5344CB8AC3E}">
+        <p14:creationId xmlns:p14="http://schemas.microsoft.com/office/powerpoint/2010/main" val="2628126137"/>
+      </p:ext>
+    </p:extLst>
   </p:cSld>
   <p:clrMapOvr>
     <a:masterClrMapping/>
@@ -545,7 +567,7 @@
 </file>
 
 <file path=ppt/notesSlides/notesSlide2.xml><?xml version="1.0" encoding="utf-8"?>
-<p:notes xmlns:a="http://schemas.openxmlformats.org/drawingml/2006/main" xmlns:r="http://schemas.openxmlformats.org/officeDocument/2006/relationships" xmlns:p="http://schemas.openxmlformats.org/presentationml/2006/main" showMasterSp="1" showMasterPhAnim="1">
+<p:notes xmlns:a="http://schemas.openxmlformats.org/drawingml/2006/main" xmlns:r="http://schemas.openxmlformats.org/officeDocument/2006/relationships" xmlns:p="http://schemas.openxmlformats.org/presentationml/2006/main">
   <p:cSld>
     <p:spTree>
       <p:nvGrpSpPr>
@@ -564,12 +586,18 @@
       <p:sp>
         <p:nvSpPr>
           <p:cNvPr id="128" name="Shape 128"/>
-          <p:cNvSpPr/>
+          <p:cNvSpPr>
+            <a:spLocks noGrp="1" noRot="1" noChangeAspect="1"/>
+          </p:cNvSpPr>
           <p:nvPr>
             <p:ph type="sldImg"/>
           </p:nvPr>
         </p:nvSpPr>
         <p:spPr>
+          <a:xfrm>
+            <a:off x="381000" y="685800"/>
+            <a:ext cx="6096000" cy="3429000"/>
+          </a:xfrm>
           <a:prstGeom prst="rect">
             <a:avLst/>
           </a:prstGeom>
@@ -578,14 +606,16 @@
           <a:bodyPr/>
           <a:lstStyle/>
           <a:p>
-            <a:pPr/>
+            <a:endParaRPr/>
           </a:p>
         </p:txBody>
       </p:sp>
       <p:sp>
         <p:nvSpPr>
           <p:cNvPr id="129" name="Shape 129"/>
-          <p:cNvSpPr/>
+          <p:cNvSpPr>
+            <a:spLocks noGrp="1"/>
+          </p:cNvSpPr>
           <p:nvPr>
             <p:ph type="body" sz="quarter" idx="1"/>
           </p:nvPr>
@@ -599,7 +629,6 @@
           <a:bodyPr/>
           <a:lstStyle/>
           <a:p>
-            <a:pPr/>
             <a:r>
               <a:t>The framework is completely dependency driven, most of the configuration is done by simply specifying the required dependencies. For example, if you want to use JPA, CDI and JAX-RS, you simply add the corresponding KumuluzEE dependencies that provide those components. The framework will then at runtime automatically find all included components and bootstrap them appropriately together. This allows us a great deal of flexibility and enables us to pick and choose which components we actually want and thus making sure our microservices are as lightweight as possible. You can even choose which implementations of a specific component you want (ex. Hibernate or EclipseLink for JPA). All of this makes it ideal to run in a Docker-like or PaaS environments.</a:t>
             </a:r>
@@ -607,6 +636,11 @@
         </p:txBody>
       </p:sp>
     </p:spTree>
+    <p:extLst>
+      <p:ext uri="{BB962C8B-B14F-4D97-AF65-F5344CB8AC3E}">
+        <p14:creationId xmlns:p14="http://schemas.microsoft.com/office/powerpoint/2010/main" val="1982628082"/>
+      </p:ext>
+    </p:extLst>
   </p:cSld>
   <p:clrMapOvr>
     <a:masterClrMapping/>
@@ -615,7 +649,7 @@
 </file>
 
 <file path=ppt/notesSlides/notesSlide3.xml><?xml version="1.0" encoding="utf-8"?>
-<p:notes xmlns:a="http://schemas.openxmlformats.org/drawingml/2006/main" xmlns:r="http://schemas.openxmlformats.org/officeDocument/2006/relationships" xmlns:p="http://schemas.openxmlformats.org/presentationml/2006/main" showMasterSp="1" showMasterPhAnim="1">
+<p:notes xmlns:a="http://schemas.openxmlformats.org/drawingml/2006/main" xmlns:r="http://schemas.openxmlformats.org/officeDocument/2006/relationships" xmlns:p="http://schemas.openxmlformats.org/presentationml/2006/main">
   <p:cSld>
     <p:spTree>
       <p:nvGrpSpPr>
@@ -634,12 +668,18 @@
       <p:sp>
         <p:nvSpPr>
           <p:cNvPr id="132" name="Shape 132"/>
-          <p:cNvSpPr/>
+          <p:cNvSpPr>
+            <a:spLocks noGrp="1" noRot="1" noChangeAspect="1"/>
+          </p:cNvSpPr>
           <p:nvPr>
             <p:ph type="sldImg"/>
           </p:nvPr>
         </p:nvSpPr>
         <p:spPr>
+          <a:xfrm>
+            <a:off x="381000" y="685800"/>
+            <a:ext cx="6096000" cy="3429000"/>
+          </a:xfrm>
           <a:prstGeom prst="rect">
             <a:avLst/>
           </a:prstGeom>
@@ -648,14 +688,16 @@
           <a:bodyPr/>
           <a:lstStyle/>
           <a:p>
-            <a:pPr/>
+            <a:endParaRPr/>
           </a:p>
         </p:txBody>
       </p:sp>
       <p:sp>
         <p:nvSpPr>
           <p:cNvPr id="133" name="Shape 133"/>
-          <p:cNvSpPr/>
+          <p:cNvSpPr>
+            <a:spLocks noGrp="1"/>
+          </p:cNvSpPr>
           <p:nvPr>
             <p:ph type="body" sz="quarter" idx="1"/>
           </p:nvPr>
@@ -669,7 +711,6 @@
           <a:bodyPr/>
           <a:lstStyle/>
           <a:p>
-            <a:pPr/>
             <a:r>
               <a:t>As stated on the slide. In addition several different implementations of components will also be added.</a:t>
             </a:r>
@@ -677,6 +718,11 @@
         </p:txBody>
       </p:sp>
     </p:spTree>
+    <p:extLst>
+      <p:ext uri="{BB962C8B-B14F-4D97-AF65-F5344CB8AC3E}">
+        <p14:creationId xmlns:p14="http://schemas.microsoft.com/office/powerpoint/2010/main" val="995712999"/>
+      </p:ext>
+    </p:extLst>
   </p:cSld>
   <p:clrMapOvr>
     <a:masterClrMapping/>
@@ -685,7 +731,7 @@
 </file>
 
 <file path=ppt/notesSlides/notesSlide4.xml><?xml version="1.0" encoding="utf-8"?>
-<p:notes xmlns:a="http://schemas.openxmlformats.org/drawingml/2006/main" xmlns:r="http://schemas.openxmlformats.org/officeDocument/2006/relationships" xmlns:p="http://schemas.openxmlformats.org/presentationml/2006/main" showMasterSp="1" showMasterPhAnim="1">
+<p:notes xmlns:a="http://schemas.openxmlformats.org/drawingml/2006/main" xmlns:r="http://schemas.openxmlformats.org/officeDocument/2006/relationships" xmlns:p="http://schemas.openxmlformats.org/presentationml/2006/main">
   <p:cSld>
     <p:spTree>
       <p:nvGrpSpPr>
@@ -704,7 +750,9 @@
       <p:sp>
         <p:nvSpPr>
           <p:cNvPr id="167" name="Shape 167"/>
-          <p:cNvSpPr/>
+          <p:cNvSpPr>
+            <a:spLocks noGrp="1" noRot="1" noChangeAspect="1"/>
+          </p:cNvSpPr>
           <p:nvPr>
             <p:ph type="sldImg"/>
           </p:nvPr>
@@ -718,14 +766,16 @@
           <a:bodyPr/>
           <a:lstStyle/>
           <a:p>
-            <a:pPr/>
+            <a:endParaRPr/>
           </a:p>
         </p:txBody>
       </p:sp>
       <p:sp>
         <p:nvSpPr>
           <p:cNvPr id="168" name="Shape 168"/>
-          <p:cNvSpPr/>
+          <p:cNvSpPr>
+            <a:spLocks noGrp="1"/>
+          </p:cNvSpPr>
           <p:nvPr>
             <p:ph type="body" sz="quarter" idx="1"/>
           </p:nvPr>
@@ -739,7 +789,6 @@
           <a:bodyPr/>
           <a:lstStyle/>
           <a:p>
-            <a:pPr/>
             <a:r>
               <a:t>KumuluzEE produces archives that act like normal processes and/or applications which means its well suited for Dockers model of a single running process. All that is required is a Docker container with Java SE and the build artefact. This makes the container very small and light. Alternatively you can build the application in the container itself (e.g. with the help of a CI server) and run it directly. Both versions allow for a seamless integration with Docker and all its derivatives.</a:t>
             </a:r>
@@ -747,6 +796,11 @@
         </p:txBody>
       </p:sp>
     </p:spTree>
+    <p:extLst>
+      <p:ext uri="{BB962C8B-B14F-4D97-AF65-F5344CB8AC3E}">
+        <p14:creationId xmlns:p14="http://schemas.microsoft.com/office/powerpoint/2010/main" val="1314465680"/>
+      </p:ext>
+    </p:extLst>
   </p:cSld>
   <p:clrMapOvr>
     <a:masterClrMapping/>
@@ -755,7 +809,7 @@
 </file>
 
 <file path=ppt/notesSlides/notesSlide5.xml><?xml version="1.0" encoding="utf-8"?>
-<p:notes xmlns:a="http://schemas.openxmlformats.org/drawingml/2006/main" xmlns:r="http://schemas.openxmlformats.org/officeDocument/2006/relationships" xmlns:p="http://schemas.openxmlformats.org/presentationml/2006/main" showMasterSp="1" showMasterPhAnim="1">
+<p:notes xmlns:a="http://schemas.openxmlformats.org/drawingml/2006/main" xmlns:r="http://schemas.openxmlformats.org/officeDocument/2006/relationships" xmlns:p="http://schemas.openxmlformats.org/presentationml/2006/main">
   <p:cSld>
     <p:spTree>
       <p:nvGrpSpPr>
@@ -774,7 +828,9 @@
       <p:sp>
         <p:nvSpPr>
           <p:cNvPr id="184" name="Shape 184"/>
-          <p:cNvSpPr/>
+          <p:cNvSpPr>
+            <a:spLocks noGrp="1" noRot="1" noChangeAspect="1"/>
+          </p:cNvSpPr>
           <p:nvPr>
             <p:ph type="sldImg"/>
           </p:nvPr>
@@ -788,14 +844,16 @@
           <a:bodyPr/>
           <a:lstStyle/>
           <a:p>
-            <a:pPr/>
+            <a:endParaRPr/>
           </a:p>
         </p:txBody>
       </p:sp>
       <p:sp>
         <p:nvSpPr>
           <p:cNvPr id="185" name="Shape 185"/>
-          <p:cNvSpPr/>
+          <p:cNvSpPr>
+            <a:spLocks noGrp="1"/>
+          </p:cNvSpPr>
           <p:nvPr>
             <p:ph type="body" sz="quarter" idx="1"/>
           </p:nvPr>
@@ -809,7 +867,6 @@
           <a:bodyPr/>
           <a:lstStyle/>
           <a:p>
-            <a:pPr/>
             <a:r>
               <a:t>Since every microservice is its own independent service scaling is greatly simplified and therefore quite flexible. If we follow the best practices and make our microservice stateless (e.g. not writing to disk, using exclusively external services), we can scale our microservice with simply increasing the number of instances and load balancing between them. And since most cloud providers and Docker-like environments support this model out of the box, its usually as simple as a command or an approriate setting. And because every microservice is separate we can scale each one of them according to their load and/or need. Many cloud environments also support dynamic scaling based on the microservice load, which makes scaling with KumuluzEE even more efficient and simple.</a:t>
             </a:r>
@@ -817,6 +874,11 @@
         </p:txBody>
       </p:sp>
     </p:spTree>
+    <p:extLst>
+      <p:ext uri="{BB962C8B-B14F-4D97-AF65-F5344CB8AC3E}">
+        <p14:creationId xmlns:p14="http://schemas.microsoft.com/office/powerpoint/2010/main" val="3445556779"/>
+      </p:ext>
+    </p:extLst>
   </p:cSld>
   <p:clrMapOvr>
     <a:masterClrMapping/>
@@ -825,7 +887,7 @@
 </file>
 
 <file path=ppt/slideLayouts/slideLayout1.xml><?xml version="1.0" encoding="utf-8"?>
-<p:sldLayout xmlns:a="http://schemas.openxmlformats.org/drawingml/2006/main" xmlns:r="http://schemas.openxmlformats.org/officeDocument/2006/relationships" xmlns:p="http://schemas.openxmlformats.org/presentationml/2006/main" type="title" showMasterSp="1" showMasterPhAnim="1">
+<p:sldLayout xmlns:a="http://schemas.openxmlformats.org/drawingml/2006/main" xmlns:r="http://schemas.openxmlformats.org/officeDocument/2006/relationships" xmlns:p="http://schemas.openxmlformats.org/presentationml/2006/main" type="title">
   <p:cSld name="Title &amp; Subtitle">
     <p:spTree>
       <p:nvGrpSpPr>
@@ -844,7 +906,9 @@
       <p:sp>
         <p:nvSpPr>
           <p:cNvPr id="11" name="Shape 11"/>
-          <p:cNvSpPr/>
+          <p:cNvSpPr>
+            <a:spLocks noGrp="1"/>
+          </p:cNvSpPr>
           <p:nvPr>
             <p:ph type="title"/>
           </p:nvPr>
@@ -862,7 +926,6 @@
           <a:bodyPr anchor="b"/>
           <a:lstStyle/>
           <a:p>
-            <a:pPr/>
             <a:r>
               <a:t>Title Text</a:t>
             </a:r>
@@ -872,7 +935,9 @@
       <p:sp>
         <p:nvSpPr>
           <p:cNvPr id="12" name="Shape 12"/>
-          <p:cNvSpPr/>
+          <p:cNvSpPr>
+            <a:spLocks noGrp="1"/>
+          </p:cNvSpPr>
           <p:nvPr>
             <p:ph type="body" sz="quarter" idx="1"/>
           </p:nvPr>
@@ -926,7 +991,6 @@
             </a:lvl5pPr>
           </a:lstStyle>
           <a:p>
-            <a:pPr/>
             <a:r>
               <a:t>Body Level One</a:t>
             </a:r>
@@ -960,7 +1024,9 @@
       <p:sp>
         <p:nvSpPr>
           <p:cNvPr id="13" name="Shape 13"/>
-          <p:cNvSpPr/>
+          <p:cNvSpPr>
+            <a:spLocks noGrp="1"/>
+          </p:cNvSpPr>
           <p:nvPr>
             <p:ph type="sldNum" sz="quarter" idx="2"/>
           </p:nvPr>
@@ -974,8 +1040,10 @@
           <a:bodyPr/>
           <a:lstStyle/>
           <a:p>
-            <a:pPr/>
-            <a:fld id="{86CB4B4D-7CA3-9044-876B-883B54F8677D}" type="slidenum"/>
+            <a:fld id="{86CB4B4D-7CA3-9044-876B-883B54F8677D}" type="slidenum">
+              <a:t>‹#›</a:t>
+            </a:fld>
+            <a:endParaRPr/>
           </a:p>
         </p:txBody>
       </p:sp>
@@ -984,12 +1052,12 @@
   <p:clrMapOvr>
     <a:masterClrMapping/>
   </p:clrMapOvr>
-  <p:transition xmlns:p14="http://schemas.microsoft.com/office/powerpoint/2010/main" spd="med" advClick="1"/>
+  <p:transition spd="med"/>
 </p:sldLayout>
 </file>
 
 <file path=ppt/slideLayouts/slideLayout10.xml><?xml version="1.0" encoding="utf-8"?>
-<p:sldLayout xmlns:a="http://schemas.openxmlformats.org/drawingml/2006/main" xmlns:r="http://schemas.openxmlformats.org/officeDocument/2006/relationships" xmlns:p="http://schemas.openxmlformats.org/presentationml/2006/main" type="tx" showMasterSp="1" showMasterPhAnim="1">
+<p:sldLayout xmlns:a="http://schemas.openxmlformats.org/drawingml/2006/main" xmlns:r="http://schemas.openxmlformats.org/officeDocument/2006/relationships" xmlns:p="http://schemas.openxmlformats.org/presentationml/2006/main" type="tx">
   <p:cSld name="Quote">
     <p:spTree>
       <p:nvGrpSpPr>
@@ -1008,7 +1076,9 @@
       <p:sp>
         <p:nvSpPr>
           <p:cNvPr id="93" name="Shape 93"/>
-          <p:cNvSpPr/>
+          <p:cNvSpPr>
+            <a:spLocks noGrp="1"/>
+          </p:cNvSpPr>
           <p:nvPr>
             <p:ph type="body" sz="quarter" idx="13"/>
           </p:nvPr>
@@ -1037,7 +1107,6 @@
             </a:lvl1pPr>
           </a:lstStyle>
           <a:p>
-            <a:pPr/>
             <a:r>
               <a:t>–Johnny Appleseed</a:t>
             </a:r>
@@ -1047,7 +1116,9 @@
       <p:sp>
         <p:nvSpPr>
           <p:cNvPr id="94" name="Shape 94"/>
-          <p:cNvSpPr/>
+          <p:cNvSpPr>
+            <a:spLocks noGrp="1"/>
+          </p:cNvSpPr>
           <p:nvPr>
             <p:ph type="body" sz="quarter" idx="14"/>
           </p:nvPr>
@@ -1075,7 +1146,6 @@
             </a:lvl1pPr>
           </a:lstStyle>
           <a:p>
-            <a:pPr/>
             <a:r>
               <a:t>“Type a quote here.”</a:t>
             </a:r>
@@ -1085,7 +1155,9 @@
       <p:sp>
         <p:nvSpPr>
           <p:cNvPr id="95" name="Shape 95"/>
-          <p:cNvSpPr/>
+          <p:cNvSpPr>
+            <a:spLocks noGrp="1"/>
+          </p:cNvSpPr>
           <p:nvPr>
             <p:ph type="sldNum" sz="quarter" idx="2"/>
           </p:nvPr>
@@ -1099,8 +1171,10 @@
           <a:bodyPr/>
           <a:lstStyle/>
           <a:p>
-            <a:pPr/>
-            <a:fld id="{86CB4B4D-7CA3-9044-876B-883B54F8677D}" type="slidenum"/>
+            <a:fld id="{86CB4B4D-7CA3-9044-876B-883B54F8677D}" type="slidenum">
+              <a:t>‹#›</a:t>
+            </a:fld>
+            <a:endParaRPr/>
           </a:p>
         </p:txBody>
       </p:sp>
@@ -1109,12 +1183,12 @@
   <p:clrMapOvr>
     <a:masterClrMapping/>
   </p:clrMapOvr>
-  <p:transition xmlns:p14="http://schemas.microsoft.com/office/powerpoint/2010/main" spd="med" advClick="1"/>
+  <p:transition spd="med"/>
 </p:sldLayout>
 </file>
 
 <file path=ppt/slideLayouts/slideLayout11.xml><?xml version="1.0" encoding="utf-8"?>
-<p:sldLayout xmlns:a="http://schemas.openxmlformats.org/drawingml/2006/main" xmlns:r="http://schemas.openxmlformats.org/officeDocument/2006/relationships" xmlns:p="http://schemas.openxmlformats.org/presentationml/2006/main" type="tx" showMasterSp="1" showMasterPhAnim="1">
+<p:sldLayout xmlns:a="http://schemas.openxmlformats.org/drawingml/2006/main" xmlns:r="http://schemas.openxmlformats.org/officeDocument/2006/relationships" xmlns:p="http://schemas.openxmlformats.org/presentationml/2006/main" type="tx">
   <p:cSld name="Photo">
     <p:spTree>
       <p:nvGrpSpPr>
@@ -1133,7 +1207,9 @@
       <p:sp>
         <p:nvSpPr>
           <p:cNvPr id="102" name="Shape 102"/>
-          <p:cNvSpPr/>
+          <p:cNvSpPr>
+            <a:spLocks noGrp="1"/>
+          </p:cNvSpPr>
           <p:nvPr>
             <p:ph type="pic" idx="13"/>
           </p:nvPr>
@@ -1153,14 +1229,16 @@
           </a:bodyPr>
           <a:lstStyle/>
           <a:p>
-            <a:pPr/>
+            <a:endParaRPr/>
           </a:p>
         </p:txBody>
       </p:sp>
       <p:sp>
         <p:nvSpPr>
           <p:cNvPr id="103" name="Shape 103"/>
-          <p:cNvSpPr/>
+          <p:cNvSpPr>
+            <a:spLocks noGrp="1"/>
+          </p:cNvSpPr>
           <p:nvPr>
             <p:ph type="sldNum" sz="quarter" idx="2"/>
           </p:nvPr>
@@ -1174,8 +1252,10 @@
           <a:bodyPr/>
           <a:lstStyle/>
           <a:p>
-            <a:pPr/>
-            <a:fld id="{86CB4B4D-7CA3-9044-876B-883B54F8677D}" type="slidenum"/>
+            <a:fld id="{86CB4B4D-7CA3-9044-876B-883B54F8677D}" type="slidenum">
+              <a:t>‹#›</a:t>
+            </a:fld>
+            <a:endParaRPr/>
           </a:p>
         </p:txBody>
       </p:sp>
@@ -1184,12 +1264,12 @@
   <p:clrMapOvr>
     <a:masterClrMapping/>
   </p:clrMapOvr>
-  <p:transition xmlns:p14="http://schemas.microsoft.com/office/powerpoint/2010/main" spd="med" advClick="1"/>
+  <p:transition spd="med"/>
 </p:sldLayout>
 </file>
 
 <file path=ppt/slideLayouts/slideLayout12.xml><?xml version="1.0" encoding="utf-8"?>
-<p:sldLayout xmlns:a="http://schemas.openxmlformats.org/drawingml/2006/main" xmlns:r="http://schemas.openxmlformats.org/officeDocument/2006/relationships" xmlns:p="http://schemas.openxmlformats.org/presentationml/2006/main" type="tx" showMasterSp="1" showMasterPhAnim="1">
+<p:sldLayout xmlns:a="http://schemas.openxmlformats.org/drawingml/2006/main" xmlns:r="http://schemas.openxmlformats.org/officeDocument/2006/relationships" xmlns:p="http://schemas.openxmlformats.org/presentationml/2006/main" type="tx">
   <p:cSld name="Blank">
     <p:spTree>
       <p:nvGrpSpPr>
@@ -1208,7 +1288,9 @@
       <p:sp>
         <p:nvSpPr>
           <p:cNvPr id="110" name="Shape 110"/>
-          <p:cNvSpPr/>
+          <p:cNvSpPr>
+            <a:spLocks noGrp="1"/>
+          </p:cNvSpPr>
           <p:nvPr>
             <p:ph type="sldNum" sz="quarter" idx="2"/>
           </p:nvPr>
@@ -1222,8 +1304,10 @@
           <a:bodyPr/>
           <a:lstStyle/>
           <a:p>
-            <a:pPr/>
-            <a:fld id="{86CB4B4D-7CA3-9044-876B-883B54F8677D}" type="slidenum"/>
+            <a:fld id="{86CB4B4D-7CA3-9044-876B-883B54F8677D}" type="slidenum">
+              <a:t>‹#›</a:t>
+            </a:fld>
+            <a:endParaRPr/>
           </a:p>
         </p:txBody>
       </p:sp>
@@ -1232,12 +1316,12 @@
   <p:clrMapOvr>
     <a:masterClrMapping/>
   </p:clrMapOvr>
-  <p:transition xmlns:p14="http://schemas.microsoft.com/office/powerpoint/2010/main" spd="med" advClick="1"/>
+  <p:transition spd="med"/>
 </p:sldLayout>
 </file>
 
 <file path=ppt/slideLayouts/slideLayout2.xml><?xml version="1.0" encoding="utf-8"?>
-<p:sldLayout xmlns:a="http://schemas.openxmlformats.org/drawingml/2006/main" xmlns:r="http://schemas.openxmlformats.org/officeDocument/2006/relationships" xmlns:p="http://schemas.openxmlformats.org/presentationml/2006/main" type="tx" showMasterSp="1" showMasterPhAnim="1">
+<p:sldLayout xmlns:a="http://schemas.openxmlformats.org/drawingml/2006/main" xmlns:r="http://schemas.openxmlformats.org/officeDocument/2006/relationships" xmlns:p="http://schemas.openxmlformats.org/presentationml/2006/main" type="tx">
   <p:cSld name="Photo - Horizontal">
     <p:spTree>
       <p:nvGrpSpPr>
@@ -1256,7 +1340,9 @@
       <p:sp>
         <p:nvSpPr>
           <p:cNvPr id="20" name="Shape 20"/>
-          <p:cNvSpPr/>
+          <p:cNvSpPr>
+            <a:spLocks noGrp="1"/>
+          </p:cNvSpPr>
           <p:nvPr>
             <p:ph type="pic" idx="13"/>
           </p:nvPr>
@@ -1276,14 +1362,16 @@
           </a:bodyPr>
           <a:lstStyle/>
           <a:p>
-            <a:pPr/>
+            <a:endParaRPr/>
           </a:p>
         </p:txBody>
       </p:sp>
       <p:sp>
         <p:nvSpPr>
           <p:cNvPr id="21" name="Shape 21"/>
-          <p:cNvSpPr/>
+          <p:cNvSpPr>
+            <a:spLocks noGrp="1"/>
+          </p:cNvSpPr>
           <p:nvPr>
             <p:ph type="title"/>
           </p:nvPr>
@@ -1301,7 +1389,6 @@
           <a:bodyPr/>
           <a:lstStyle/>
           <a:p>
-            <a:pPr/>
             <a:r>
               <a:t>Title Text</a:t>
             </a:r>
@@ -1311,7 +1398,9 @@
       <p:sp>
         <p:nvSpPr>
           <p:cNvPr id="22" name="Shape 22"/>
-          <p:cNvSpPr/>
+          <p:cNvSpPr>
+            <a:spLocks noGrp="1"/>
+          </p:cNvSpPr>
           <p:nvPr>
             <p:ph type="body" sz="quarter" idx="1"/>
           </p:nvPr>
@@ -1365,7 +1454,6 @@
             </a:lvl5pPr>
           </a:lstStyle>
           <a:p>
-            <a:pPr/>
             <a:r>
               <a:t>Body Level One</a:t>
             </a:r>
@@ -1399,7 +1487,9 @@
       <p:sp>
         <p:nvSpPr>
           <p:cNvPr id="23" name="Shape 23"/>
-          <p:cNvSpPr/>
+          <p:cNvSpPr>
+            <a:spLocks noGrp="1"/>
+          </p:cNvSpPr>
           <p:nvPr>
             <p:ph type="sldNum" sz="quarter" idx="2"/>
           </p:nvPr>
@@ -1413,8 +1503,10 @@
           <a:bodyPr/>
           <a:lstStyle/>
           <a:p>
-            <a:pPr/>
-            <a:fld id="{86CB4B4D-7CA3-9044-876B-883B54F8677D}" type="slidenum"/>
+            <a:fld id="{86CB4B4D-7CA3-9044-876B-883B54F8677D}" type="slidenum">
+              <a:t>‹#›</a:t>
+            </a:fld>
+            <a:endParaRPr/>
           </a:p>
         </p:txBody>
       </p:sp>
@@ -1423,12 +1515,12 @@
   <p:clrMapOvr>
     <a:masterClrMapping/>
   </p:clrMapOvr>
-  <p:transition xmlns:p14="http://schemas.microsoft.com/office/powerpoint/2010/main" spd="med" advClick="1"/>
+  <p:transition spd="med"/>
 </p:sldLayout>
 </file>
 
 <file path=ppt/slideLayouts/slideLayout3.xml><?xml version="1.0" encoding="utf-8"?>
-<p:sldLayout xmlns:a="http://schemas.openxmlformats.org/drawingml/2006/main" xmlns:r="http://schemas.openxmlformats.org/officeDocument/2006/relationships" xmlns:p="http://schemas.openxmlformats.org/presentationml/2006/main" type="tx" showMasterSp="1" showMasterPhAnim="1">
+<p:sldLayout xmlns:a="http://schemas.openxmlformats.org/drawingml/2006/main" xmlns:r="http://schemas.openxmlformats.org/officeDocument/2006/relationships" xmlns:p="http://schemas.openxmlformats.org/presentationml/2006/main" type="tx">
   <p:cSld name="Title - Center">
     <p:spTree>
       <p:nvGrpSpPr>
@@ -1447,7 +1539,9 @@
       <p:sp>
         <p:nvSpPr>
           <p:cNvPr id="30" name="Shape 30"/>
-          <p:cNvSpPr/>
+          <p:cNvSpPr>
+            <a:spLocks noGrp="1"/>
+          </p:cNvSpPr>
           <p:nvPr>
             <p:ph type="title"/>
           </p:nvPr>
@@ -1465,7 +1559,6 @@
           <a:bodyPr/>
           <a:lstStyle/>
           <a:p>
-            <a:pPr/>
             <a:r>
               <a:t>Title Text</a:t>
             </a:r>
@@ -1475,7 +1568,9 @@
       <p:sp>
         <p:nvSpPr>
           <p:cNvPr id="31" name="Shape 31"/>
-          <p:cNvSpPr/>
+          <p:cNvSpPr>
+            <a:spLocks noGrp="1"/>
+          </p:cNvSpPr>
           <p:nvPr>
             <p:ph type="sldNum" sz="quarter" idx="2"/>
           </p:nvPr>
@@ -1489,8 +1584,10 @@
           <a:bodyPr/>
           <a:lstStyle/>
           <a:p>
-            <a:pPr/>
-            <a:fld id="{86CB4B4D-7CA3-9044-876B-883B54F8677D}" type="slidenum"/>
+            <a:fld id="{86CB4B4D-7CA3-9044-876B-883B54F8677D}" type="slidenum">
+              <a:t>‹#›</a:t>
+            </a:fld>
+            <a:endParaRPr/>
           </a:p>
         </p:txBody>
       </p:sp>
@@ -1499,12 +1596,12 @@
   <p:clrMapOvr>
     <a:masterClrMapping/>
   </p:clrMapOvr>
-  <p:transition xmlns:p14="http://schemas.microsoft.com/office/powerpoint/2010/main" spd="med" advClick="1"/>
+  <p:transition spd="med"/>
 </p:sldLayout>
 </file>
 
 <file path=ppt/slideLayouts/slideLayout4.xml><?xml version="1.0" encoding="utf-8"?>
-<p:sldLayout xmlns:a="http://schemas.openxmlformats.org/drawingml/2006/main" xmlns:r="http://schemas.openxmlformats.org/officeDocument/2006/relationships" xmlns:p="http://schemas.openxmlformats.org/presentationml/2006/main" type="tx" showMasterSp="1" showMasterPhAnim="1">
+<p:sldLayout xmlns:a="http://schemas.openxmlformats.org/drawingml/2006/main" xmlns:r="http://schemas.openxmlformats.org/officeDocument/2006/relationships" xmlns:p="http://schemas.openxmlformats.org/presentationml/2006/main" type="tx">
   <p:cSld name="Photo - Vertical">
     <p:spTree>
       <p:nvGrpSpPr>
@@ -1523,7 +1620,9 @@
       <p:sp>
         <p:nvSpPr>
           <p:cNvPr id="38" name="Shape 38"/>
-          <p:cNvSpPr/>
+          <p:cNvSpPr>
+            <a:spLocks noGrp="1"/>
+          </p:cNvSpPr>
           <p:nvPr>
             <p:ph type="pic" sz="half" idx="13"/>
           </p:nvPr>
@@ -1543,14 +1642,16 @@
           </a:bodyPr>
           <a:lstStyle/>
           <a:p>
-            <a:pPr/>
+            <a:endParaRPr/>
           </a:p>
         </p:txBody>
       </p:sp>
       <p:sp>
         <p:nvSpPr>
           <p:cNvPr id="39" name="Shape 39"/>
-          <p:cNvSpPr/>
+          <p:cNvSpPr>
+            <a:spLocks noGrp="1"/>
+          </p:cNvSpPr>
           <p:nvPr>
             <p:ph type="title"/>
           </p:nvPr>
@@ -1568,7 +1669,6 @@
           <a:bodyPr anchor="b"/>
           <a:lstStyle/>
           <a:p>
-            <a:pPr/>
             <a:r>
               <a:t>Title Text</a:t>
             </a:r>
@@ -1578,7 +1678,9 @@
       <p:sp>
         <p:nvSpPr>
           <p:cNvPr id="40" name="Shape 40"/>
-          <p:cNvSpPr/>
+          <p:cNvSpPr>
+            <a:spLocks noGrp="1"/>
+          </p:cNvSpPr>
           <p:nvPr>
             <p:ph type="body" sz="quarter" idx="1"/>
           </p:nvPr>
@@ -1632,7 +1734,6 @@
             </a:lvl5pPr>
           </a:lstStyle>
           <a:p>
-            <a:pPr/>
             <a:r>
               <a:t>Body Level One</a:t>
             </a:r>
@@ -1666,7 +1767,9 @@
       <p:sp>
         <p:nvSpPr>
           <p:cNvPr id="41" name="Shape 41"/>
-          <p:cNvSpPr/>
+          <p:cNvSpPr>
+            <a:spLocks noGrp="1"/>
+          </p:cNvSpPr>
           <p:nvPr>
             <p:ph type="sldNum" sz="quarter" idx="2"/>
           </p:nvPr>
@@ -1680,8 +1783,10 @@
           <a:bodyPr/>
           <a:lstStyle/>
           <a:p>
-            <a:pPr/>
-            <a:fld id="{86CB4B4D-7CA3-9044-876B-883B54F8677D}" type="slidenum"/>
+            <a:fld id="{86CB4B4D-7CA3-9044-876B-883B54F8677D}" type="slidenum">
+              <a:t>‹#›</a:t>
+            </a:fld>
+            <a:endParaRPr/>
           </a:p>
         </p:txBody>
       </p:sp>
@@ -1690,12 +1795,12 @@
   <p:clrMapOvr>
     <a:masterClrMapping/>
   </p:clrMapOvr>
-  <p:transition xmlns:p14="http://schemas.microsoft.com/office/powerpoint/2010/main" spd="med" advClick="1"/>
+  <p:transition spd="med"/>
 </p:sldLayout>
 </file>
 
 <file path=ppt/slideLayouts/slideLayout5.xml><?xml version="1.0" encoding="utf-8"?>
-<p:sldLayout xmlns:a="http://schemas.openxmlformats.org/drawingml/2006/main" xmlns:r="http://schemas.openxmlformats.org/officeDocument/2006/relationships" xmlns:p="http://schemas.openxmlformats.org/presentationml/2006/main" type="tx" showMasterSp="1" showMasterPhAnim="1">
+<p:sldLayout xmlns:a="http://schemas.openxmlformats.org/drawingml/2006/main" xmlns:r="http://schemas.openxmlformats.org/officeDocument/2006/relationships" xmlns:p="http://schemas.openxmlformats.org/presentationml/2006/main" type="tx">
   <p:cSld name="Title - Top">
     <p:spTree>
       <p:nvGrpSpPr>
@@ -1714,7 +1819,9 @@
       <p:sp>
         <p:nvSpPr>
           <p:cNvPr id="48" name="Shape 48"/>
-          <p:cNvSpPr/>
+          <p:cNvSpPr>
+            <a:spLocks noGrp="1"/>
+          </p:cNvSpPr>
           <p:nvPr>
             <p:ph type="title"/>
           </p:nvPr>
@@ -1728,7 +1835,6 @@
           <a:bodyPr/>
           <a:lstStyle/>
           <a:p>
-            <a:pPr/>
             <a:r>
               <a:t>Title Text</a:t>
             </a:r>
@@ -1738,7 +1844,9 @@
       <p:sp>
         <p:nvSpPr>
           <p:cNvPr id="49" name="Shape 49"/>
-          <p:cNvSpPr/>
+          <p:cNvSpPr>
+            <a:spLocks noGrp="1"/>
+          </p:cNvSpPr>
           <p:nvPr>
             <p:ph type="sldNum" sz="quarter" idx="2"/>
           </p:nvPr>
@@ -1752,8 +1860,10 @@
           <a:bodyPr/>
           <a:lstStyle/>
           <a:p>
-            <a:pPr/>
-            <a:fld id="{86CB4B4D-7CA3-9044-876B-883B54F8677D}" type="slidenum"/>
+            <a:fld id="{86CB4B4D-7CA3-9044-876B-883B54F8677D}" type="slidenum">
+              <a:t>‹#›</a:t>
+            </a:fld>
+            <a:endParaRPr/>
           </a:p>
         </p:txBody>
       </p:sp>
@@ -1762,12 +1872,12 @@
   <p:clrMapOvr>
     <a:masterClrMapping/>
   </p:clrMapOvr>
-  <p:transition xmlns:p14="http://schemas.microsoft.com/office/powerpoint/2010/main" spd="med" advClick="1"/>
+  <p:transition spd="med"/>
 </p:sldLayout>
 </file>
 
 <file path=ppt/slideLayouts/slideLayout6.xml><?xml version="1.0" encoding="utf-8"?>
-<p:sldLayout xmlns:a="http://schemas.openxmlformats.org/drawingml/2006/main" xmlns:r="http://schemas.openxmlformats.org/officeDocument/2006/relationships" xmlns:p="http://schemas.openxmlformats.org/presentationml/2006/main" type="tx" showMasterSp="1" showMasterPhAnim="1">
+<p:sldLayout xmlns:a="http://schemas.openxmlformats.org/drawingml/2006/main" xmlns:r="http://schemas.openxmlformats.org/officeDocument/2006/relationships" xmlns:p="http://schemas.openxmlformats.org/presentationml/2006/main" type="tx">
   <p:cSld name="Title &amp; Bullets">
     <p:spTree>
       <p:nvGrpSpPr>
@@ -1786,7 +1896,9 @@
       <p:sp>
         <p:nvSpPr>
           <p:cNvPr id="56" name="Shape 56"/>
-          <p:cNvSpPr/>
+          <p:cNvSpPr>
+            <a:spLocks noGrp="1"/>
+          </p:cNvSpPr>
           <p:nvPr>
             <p:ph type="title"/>
           </p:nvPr>
@@ -1800,7 +1912,6 @@
           <a:bodyPr/>
           <a:lstStyle/>
           <a:p>
-            <a:pPr/>
             <a:r>
               <a:t>Title Text</a:t>
             </a:r>
@@ -1810,7 +1921,9 @@
       <p:sp>
         <p:nvSpPr>
           <p:cNvPr id="57" name="Shape 57"/>
-          <p:cNvSpPr/>
+          <p:cNvSpPr>
+            <a:spLocks noGrp="1"/>
+          </p:cNvSpPr>
           <p:nvPr>
             <p:ph type="body" idx="1"/>
           </p:nvPr>
@@ -1870,7 +1983,6 @@
             </a:lvl5pPr>
           </a:lstStyle>
           <a:p>
-            <a:pPr/>
             <a:r>
               <a:t>Body Level One</a:t>
             </a:r>
@@ -1904,7 +2016,9 @@
       <p:sp>
         <p:nvSpPr>
           <p:cNvPr id="58" name="Shape 58"/>
-          <p:cNvSpPr/>
+          <p:cNvSpPr>
+            <a:spLocks noGrp="1"/>
+          </p:cNvSpPr>
           <p:nvPr>
             <p:ph type="sldNum" sz="quarter" idx="2"/>
           </p:nvPr>
@@ -1918,8 +2032,10 @@
           <a:bodyPr/>
           <a:lstStyle/>
           <a:p>
-            <a:pPr/>
-            <a:fld id="{86CB4B4D-7CA3-9044-876B-883B54F8677D}" type="slidenum"/>
+            <a:fld id="{86CB4B4D-7CA3-9044-876B-883B54F8677D}" type="slidenum">
+              <a:t>‹#›</a:t>
+            </a:fld>
+            <a:endParaRPr/>
           </a:p>
         </p:txBody>
       </p:sp>
@@ -1928,12 +2044,12 @@
   <p:clrMapOvr>
     <a:masterClrMapping/>
   </p:clrMapOvr>
-  <p:transition xmlns:p14="http://schemas.microsoft.com/office/powerpoint/2010/main" spd="med" advClick="1"/>
+  <p:transition spd="med"/>
 </p:sldLayout>
 </file>
 
 <file path=ppt/slideLayouts/slideLayout7.xml><?xml version="1.0" encoding="utf-8"?>
-<p:sldLayout xmlns:a="http://schemas.openxmlformats.org/drawingml/2006/main" xmlns:r="http://schemas.openxmlformats.org/officeDocument/2006/relationships" xmlns:p="http://schemas.openxmlformats.org/presentationml/2006/main" type="tx" showMasterSp="1" showMasterPhAnim="1">
+<p:sldLayout xmlns:a="http://schemas.openxmlformats.org/drawingml/2006/main" xmlns:r="http://schemas.openxmlformats.org/officeDocument/2006/relationships" xmlns:p="http://schemas.openxmlformats.org/presentationml/2006/main" type="tx">
   <p:cSld name="Title, Bullets &amp; Photo">
     <p:spTree>
       <p:nvGrpSpPr>
@@ -1952,7 +2068,9 @@
       <p:sp>
         <p:nvSpPr>
           <p:cNvPr id="65" name="Shape 65"/>
-          <p:cNvSpPr/>
+          <p:cNvSpPr>
+            <a:spLocks noGrp="1"/>
+          </p:cNvSpPr>
           <p:nvPr>
             <p:ph type="pic" sz="half" idx="13"/>
           </p:nvPr>
@@ -1972,14 +2090,16 @@
           </a:bodyPr>
           <a:lstStyle/>
           <a:p>
-            <a:pPr/>
+            <a:endParaRPr/>
           </a:p>
         </p:txBody>
       </p:sp>
       <p:sp>
         <p:nvSpPr>
           <p:cNvPr id="66" name="Shape 66"/>
-          <p:cNvSpPr/>
+          <p:cNvSpPr>
+            <a:spLocks noGrp="1"/>
+          </p:cNvSpPr>
           <p:nvPr>
             <p:ph type="title"/>
           </p:nvPr>
@@ -1993,7 +2113,6 @@
           <a:bodyPr/>
           <a:lstStyle/>
           <a:p>
-            <a:pPr/>
             <a:r>
               <a:t>Title Text</a:t>
             </a:r>
@@ -2003,7 +2122,9 @@
       <p:sp>
         <p:nvSpPr>
           <p:cNvPr id="67" name="Shape 67"/>
-          <p:cNvSpPr/>
+          <p:cNvSpPr>
+            <a:spLocks noGrp="1"/>
+          </p:cNvSpPr>
           <p:nvPr>
             <p:ph type="body" sz="half" idx="1"/>
           </p:nvPr>
@@ -2021,7 +2142,6 @@
           <a:bodyPr/>
           <a:lstStyle/>
           <a:p>
-            <a:pPr/>
             <a:r>
               <a:t>Body Level One</a:t>
             </a:r>
@@ -2055,7 +2175,9 @@
       <p:sp>
         <p:nvSpPr>
           <p:cNvPr id="68" name="Shape 68"/>
-          <p:cNvSpPr/>
+          <p:cNvSpPr>
+            <a:spLocks noGrp="1"/>
+          </p:cNvSpPr>
           <p:nvPr>
             <p:ph type="sldNum" sz="quarter" idx="2"/>
           </p:nvPr>
@@ -2069,8 +2191,10 @@
           <a:bodyPr/>
           <a:lstStyle/>
           <a:p>
-            <a:pPr/>
-            <a:fld id="{86CB4B4D-7CA3-9044-876B-883B54F8677D}" type="slidenum"/>
+            <a:fld id="{86CB4B4D-7CA3-9044-876B-883B54F8677D}" type="slidenum">
+              <a:t>‹#›</a:t>
+            </a:fld>
+            <a:endParaRPr/>
           </a:p>
         </p:txBody>
       </p:sp>
@@ -2079,12 +2203,12 @@
   <p:clrMapOvr>
     <a:masterClrMapping/>
   </p:clrMapOvr>
-  <p:transition xmlns:p14="http://schemas.microsoft.com/office/powerpoint/2010/main" spd="med" advClick="1"/>
+  <p:transition spd="med"/>
 </p:sldLayout>
 </file>
 
 <file path=ppt/slideLayouts/slideLayout8.xml><?xml version="1.0" encoding="utf-8"?>
-<p:sldLayout xmlns:a="http://schemas.openxmlformats.org/drawingml/2006/main" xmlns:r="http://schemas.openxmlformats.org/officeDocument/2006/relationships" xmlns:p="http://schemas.openxmlformats.org/presentationml/2006/main" type="tx" showMasterSp="1" showMasterPhAnim="1">
+<p:sldLayout xmlns:a="http://schemas.openxmlformats.org/drawingml/2006/main" xmlns:r="http://schemas.openxmlformats.org/officeDocument/2006/relationships" xmlns:p="http://schemas.openxmlformats.org/presentationml/2006/main" type="tx">
   <p:cSld name="Bullets">
     <p:spTree>
       <p:nvGrpSpPr>
@@ -2103,7 +2227,9 @@
       <p:sp>
         <p:nvSpPr>
           <p:cNvPr id="75" name="Shape 75"/>
-          <p:cNvSpPr/>
+          <p:cNvSpPr>
+            <a:spLocks noGrp="1"/>
+          </p:cNvSpPr>
           <p:nvPr>
             <p:ph type="body" idx="1"/>
           </p:nvPr>
@@ -2167,7 +2293,6 @@
             </a:lvl5pPr>
           </a:lstStyle>
           <a:p>
-            <a:pPr/>
             <a:r>
               <a:t>Body Level One</a:t>
             </a:r>
@@ -2201,7 +2326,9 @@
       <p:sp>
         <p:nvSpPr>
           <p:cNvPr id="76" name="Shape 76"/>
-          <p:cNvSpPr/>
+          <p:cNvSpPr>
+            <a:spLocks noGrp="1"/>
+          </p:cNvSpPr>
           <p:nvPr>
             <p:ph type="sldNum" sz="quarter" idx="2"/>
           </p:nvPr>
@@ -2215,8 +2342,10 @@
           <a:bodyPr/>
           <a:lstStyle/>
           <a:p>
-            <a:pPr/>
-            <a:fld id="{86CB4B4D-7CA3-9044-876B-883B54F8677D}" type="slidenum"/>
+            <a:fld id="{86CB4B4D-7CA3-9044-876B-883B54F8677D}" type="slidenum">
+              <a:t>‹#›</a:t>
+            </a:fld>
+            <a:endParaRPr/>
           </a:p>
         </p:txBody>
       </p:sp>
@@ -2225,12 +2354,12 @@
   <p:clrMapOvr>
     <a:masterClrMapping/>
   </p:clrMapOvr>
-  <p:transition xmlns:p14="http://schemas.microsoft.com/office/powerpoint/2010/main" spd="med" advClick="1"/>
+  <p:transition spd="med"/>
 </p:sldLayout>
 </file>
 
 <file path=ppt/slideLayouts/slideLayout9.xml><?xml version="1.0" encoding="utf-8"?>
-<p:sldLayout xmlns:a="http://schemas.openxmlformats.org/drawingml/2006/main" xmlns:r="http://schemas.openxmlformats.org/officeDocument/2006/relationships" xmlns:p="http://schemas.openxmlformats.org/presentationml/2006/main" type="tx" showMasterSp="1" showMasterPhAnim="1">
+<p:sldLayout xmlns:a="http://schemas.openxmlformats.org/drawingml/2006/main" xmlns:r="http://schemas.openxmlformats.org/officeDocument/2006/relationships" xmlns:p="http://schemas.openxmlformats.org/presentationml/2006/main" type="tx">
   <p:cSld name="Photo - 3 Up">
     <p:spTree>
       <p:nvGrpSpPr>
@@ -2249,7 +2378,9 @@
       <p:sp>
         <p:nvSpPr>
           <p:cNvPr id="83" name="Shape 83"/>
-          <p:cNvSpPr/>
+          <p:cNvSpPr>
+            <a:spLocks noGrp="1"/>
+          </p:cNvSpPr>
           <p:nvPr>
             <p:ph type="pic" sz="quarter" idx="13"/>
           </p:nvPr>
@@ -2269,14 +2400,16 @@
           </a:bodyPr>
           <a:lstStyle/>
           <a:p>
-            <a:pPr/>
+            <a:endParaRPr/>
           </a:p>
         </p:txBody>
       </p:sp>
       <p:sp>
         <p:nvSpPr>
           <p:cNvPr id="84" name="Shape 84"/>
-          <p:cNvSpPr/>
+          <p:cNvSpPr>
+            <a:spLocks noGrp="1"/>
+          </p:cNvSpPr>
           <p:nvPr>
             <p:ph type="pic" sz="quarter" idx="14"/>
           </p:nvPr>
@@ -2296,14 +2429,16 @@
           </a:bodyPr>
           <a:lstStyle/>
           <a:p>
-            <a:pPr/>
+            <a:endParaRPr/>
           </a:p>
         </p:txBody>
       </p:sp>
       <p:sp>
         <p:nvSpPr>
           <p:cNvPr id="85" name="Shape 85"/>
-          <p:cNvSpPr/>
+          <p:cNvSpPr>
+            <a:spLocks noGrp="1"/>
+          </p:cNvSpPr>
           <p:nvPr>
             <p:ph type="pic" idx="15"/>
           </p:nvPr>
@@ -2323,14 +2458,16 @@
           </a:bodyPr>
           <a:lstStyle/>
           <a:p>
-            <a:pPr/>
+            <a:endParaRPr/>
           </a:p>
         </p:txBody>
       </p:sp>
       <p:sp>
         <p:nvSpPr>
           <p:cNvPr id="86" name="Shape 86"/>
-          <p:cNvSpPr/>
+          <p:cNvSpPr>
+            <a:spLocks noGrp="1"/>
+          </p:cNvSpPr>
           <p:nvPr>
             <p:ph type="sldNum" sz="quarter" idx="2"/>
           </p:nvPr>
@@ -2344,8 +2481,10 @@
           <a:bodyPr/>
           <a:lstStyle/>
           <a:p>
-            <a:pPr/>
-            <a:fld id="{86CB4B4D-7CA3-9044-876B-883B54F8677D}" type="slidenum"/>
+            <a:fld id="{86CB4B4D-7CA3-9044-876B-883B54F8677D}" type="slidenum">
+              <a:t>‹#›</a:t>
+            </a:fld>
+            <a:endParaRPr/>
           </a:p>
         </p:txBody>
       </p:sp>
@@ -2354,7 +2493,7 @@
   <p:clrMapOvr>
     <a:masterClrMapping/>
   </p:clrMapOvr>
-  <p:transition xmlns:p14="http://schemas.microsoft.com/office/powerpoint/2010/main" spd="med" advClick="1"/>
+  <p:transition spd="med"/>
 </p:sldLayout>
 </file>
 
@@ -2364,12 +2503,13 @@
     <p:bg>
       <p:bgPr>
         <a:blipFill rotWithShape="1">
-          <a:blip r:embed="rId2"/>
-          <a:srcRect l="0" t="0" r="0" b="0"/>
+          <a:blip r:embed="rId14"/>
+          <a:srcRect/>
           <a:stretch>
             <a:fillRect/>
           </a:stretch>
         </a:blipFill>
+        <a:effectLst/>
       </p:bgPr>
     </p:bg>
     <p:spTree>
@@ -2389,7 +2529,9 @@
       <p:sp>
         <p:nvSpPr>
           <p:cNvPr id="2" name="Shape 2"/>
-          <p:cNvSpPr/>
+          <p:cNvSpPr>
+            <a:spLocks noGrp="1"/>
+          </p:cNvSpPr>
           <p:nvPr>
             <p:ph type="title"/>
           </p:nvPr>
@@ -2407,17 +2549,16 @@
           </a:ln>
           <a:extLst>
             <a:ext uri="{C572A759-6A51-4108-AA02-DFA0A04FC94B}">
-              <ma14:wrappingTextBoxFlag xmlns:ma14="http://schemas.microsoft.com/office/mac/drawingml/2011/main" val="1"/>
+              <ma14:wrappingTextBoxFlag xmlns:ma14="http://schemas.microsoft.com/office/mac/drawingml/2011/main" xmlns="" val="1"/>
             </a:ext>
           </a:extLst>
         </p:spPr>
         <p:txBody>
           <a:bodyPr lIns="50800" tIns="50800" rIns="50800" bIns="50800" anchor="ctr">
-            <a:normAutofit fontScale="100000" lnSpcReduction="0"/>
+            <a:normAutofit/>
           </a:bodyPr>
           <a:lstStyle/>
           <a:p>
-            <a:pPr/>
             <a:r>
               <a:t>Title Text</a:t>
             </a:r>
@@ -2427,7 +2568,9 @@
       <p:sp>
         <p:nvSpPr>
           <p:cNvPr id="3" name="Shape 3"/>
-          <p:cNvSpPr/>
+          <p:cNvSpPr>
+            <a:spLocks noGrp="1"/>
+          </p:cNvSpPr>
           <p:nvPr>
             <p:ph type="body" idx="1"/>
           </p:nvPr>
@@ -2445,17 +2588,16 @@
           </a:ln>
           <a:extLst>
             <a:ext uri="{C572A759-6A51-4108-AA02-DFA0A04FC94B}">
-              <ma14:wrappingTextBoxFlag xmlns:ma14="http://schemas.microsoft.com/office/mac/drawingml/2011/main" val="1"/>
+              <ma14:wrappingTextBoxFlag xmlns:ma14="http://schemas.microsoft.com/office/mac/drawingml/2011/main" xmlns="" val="1"/>
             </a:ext>
           </a:extLst>
         </p:spPr>
         <p:txBody>
           <a:bodyPr lIns="50800" tIns="50800" rIns="50800" bIns="50800" anchor="ctr">
-            <a:normAutofit fontScale="100000" lnSpcReduction="0"/>
+            <a:normAutofit/>
           </a:bodyPr>
           <a:lstStyle/>
           <a:p>
-            <a:pPr/>
             <a:r>
               <a:t>Body Level One</a:t>
             </a:r>
@@ -2489,7 +2631,9 @@
       <p:sp>
         <p:nvSpPr>
           <p:cNvPr id="4" name="Shape 4"/>
-          <p:cNvSpPr/>
+          <p:cNvSpPr>
+            <a:spLocks noGrp="1"/>
+          </p:cNvSpPr>
           <p:nvPr>
             <p:ph type="sldNum" sz="quarter" idx="2"/>
           </p:nvPr>
@@ -2516,8 +2660,10 @@
             </a:lvl1pPr>
           </a:lstStyle>
           <a:p>
-            <a:pPr/>
-            <a:fld id="{86CB4B4D-7CA3-9044-876B-883B54F8677D}" type="slidenum"/>
+            <a:fld id="{86CB4B4D-7CA3-9044-876B-883B54F8677D}" type="slidenum">
+              <a:t>‹#›</a:t>
+            </a:fld>
+            <a:endParaRPr/>
           </a:p>
         </p:txBody>
       </p:sp>
@@ -2525,20 +2671,20 @@
   </p:cSld>
   <p:clrMap bg1="lt1" tx1="dk1" bg2="lt2" tx2="dk2" accent1="accent1" accent2="accent2" accent3="accent3" accent4="accent4" accent5="accent5" accent6="accent6" hlink="hlink" folHlink="folHlink"/>
   <p:sldLayoutIdLst>
-    <p:sldLayoutId id="2147483649" r:id="rId3"/>
-    <p:sldLayoutId id="2147483650" r:id="rId4"/>
-    <p:sldLayoutId id="2147483651" r:id="rId5"/>
-    <p:sldLayoutId id="2147483652" r:id="rId6"/>
-    <p:sldLayoutId id="2147483653" r:id="rId7"/>
-    <p:sldLayoutId id="2147483654" r:id="rId8"/>
-    <p:sldLayoutId id="2147483655" r:id="rId9"/>
-    <p:sldLayoutId id="2147483656" r:id="rId10"/>
-    <p:sldLayoutId id="2147483657" r:id="rId11"/>
-    <p:sldLayoutId id="2147483658" r:id="rId12"/>
-    <p:sldLayoutId id="2147483659" r:id="rId13"/>
-    <p:sldLayoutId id="2147483660" r:id="rId14"/>
+    <p:sldLayoutId id="2147483649" r:id="rId1"/>
+    <p:sldLayoutId id="2147483650" r:id="rId2"/>
+    <p:sldLayoutId id="2147483651" r:id="rId3"/>
+    <p:sldLayoutId id="2147483652" r:id="rId4"/>
+    <p:sldLayoutId id="2147483653" r:id="rId5"/>
+    <p:sldLayoutId id="2147483654" r:id="rId6"/>
+    <p:sldLayoutId id="2147483655" r:id="rId7"/>
+    <p:sldLayoutId id="2147483656" r:id="rId8"/>
+    <p:sldLayoutId id="2147483657" r:id="rId9"/>
+    <p:sldLayoutId id="2147483658" r:id="rId10"/>
+    <p:sldLayoutId id="2147483659" r:id="rId11"/>
+    <p:sldLayoutId id="2147483660" r:id="rId12"/>
   </p:sldLayoutIdLst>
-  <p:transition xmlns:p14="http://schemas.microsoft.com/office/powerpoint/2010/main" spd="med" advClick="1"/>
+  <p:transition spd="med"/>
   <p:txStyles>
     <p:titleStyle>
       <a:lvl1pPr marL="0" marR="0" indent="0" algn="ctr" defTabSz="825500" rtl="0" latinLnBrk="0">
@@ -2556,7 +2702,7 @@
         <a:buFontTx/>
         <a:buNone/>
         <a:tabLst/>
-        <a:defRPr b="0" baseline="0" cap="all" i="0" spc="0" strike="noStrike" sz="10000" u="none">
+        <a:defRPr sz="10000" b="0" i="0" u="none" strike="noStrike" cap="all" spc="0" baseline="0">
           <a:ln>
             <a:noFill/>
           </a:ln>
@@ -2585,7 +2731,7 @@
         <a:buFontTx/>
         <a:buNone/>
         <a:tabLst/>
-        <a:defRPr b="0" baseline="0" cap="all" i="0" spc="0" strike="noStrike" sz="10000" u="none">
+        <a:defRPr sz="10000" b="0" i="0" u="none" strike="noStrike" cap="all" spc="0" baseline="0">
           <a:ln>
             <a:noFill/>
           </a:ln>
@@ -2614,7 +2760,7 @@
         <a:buFontTx/>
         <a:buNone/>
         <a:tabLst/>
-        <a:defRPr b="0" baseline="0" cap="all" i="0" spc="0" strike="noStrike" sz="10000" u="none">
+        <a:defRPr sz="10000" b="0" i="0" u="none" strike="noStrike" cap="all" spc="0" baseline="0">
           <a:ln>
             <a:noFill/>
           </a:ln>
@@ -2643,7 +2789,7 @@
         <a:buFontTx/>
         <a:buNone/>
         <a:tabLst/>
-        <a:defRPr b="0" baseline="0" cap="all" i="0" spc="0" strike="noStrike" sz="10000" u="none">
+        <a:defRPr sz="10000" b="0" i="0" u="none" strike="noStrike" cap="all" spc="0" baseline="0">
           <a:ln>
             <a:noFill/>
           </a:ln>
@@ -2672,7 +2818,7 @@
         <a:buFontTx/>
         <a:buNone/>
         <a:tabLst/>
-        <a:defRPr b="0" baseline="0" cap="all" i="0" spc="0" strike="noStrike" sz="10000" u="none">
+        <a:defRPr sz="10000" b="0" i="0" u="none" strike="noStrike" cap="all" spc="0" baseline="0">
           <a:ln>
             <a:noFill/>
           </a:ln>
@@ -2701,7 +2847,7 @@
         <a:buFontTx/>
         <a:buNone/>
         <a:tabLst/>
-        <a:defRPr b="0" baseline="0" cap="all" i="0" spc="0" strike="noStrike" sz="10000" u="none">
+        <a:defRPr sz="10000" b="0" i="0" u="none" strike="noStrike" cap="all" spc="0" baseline="0">
           <a:ln>
             <a:noFill/>
           </a:ln>
@@ -2730,7 +2876,7 @@
         <a:buFontTx/>
         <a:buNone/>
         <a:tabLst/>
-        <a:defRPr b="0" baseline="0" cap="all" i="0" spc="0" strike="noStrike" sz="10000" u="none">
+        <a:defRPr sz="10000" b="0" i="0" u="none" strike="noStrike" cap="all" spc="0" baseline="0">
           <a:ln>
             <a:noFill/>
           </a:ln>
@@ -2759,7 +2905,7 @@
         <a:buFontTx/>
         <a:buNone/>
         <a:tabLst/>
-        <a:defRPr b="0" baseline="0" cap="all" i="0" spc="0" strike="noStrike" sz="10000" u="none">
+        <a:defRPr sz="10000" b="0" i="0" u="none" strike="noStrike" cap="all" spc="0" baseline="0">
           <a:ln>
             <a:noFill/>
           </a:ln>
@@ -2788,7 +2934,7 @@
         <a:buFontTx/>
         <a:buNone/>
         <a:tabLst/>
-        <a:defRPr b="0" baseline="0" cap="all" i="0" spc="0" strike="noStrike" sz="10000" u="none">
+        <a:defRPr sz="10000" b="0" i="0" u="none" strike="noStrike" cap="all" spc="0" baseline="0">
           <a:ln>
             <a:noFill/>
           </a:ln>
@@ -2819,7 +2965,7 @@
         <a:buFontTx/>
         <a:buChar char="•"/>
         <a:tabLst/>
-        <a:defRPr b="0" baseline="0" cap="none" i="0" spc="0" strike="noStrike" sz="5200" u="none">
+        <a:defRPr sz="5200" b="0" i="0" u="none" strike="noStrike" cap="none" spc="0" baseline="0">
           <a:ln>
             <a:noFill/>
           </a:ln>
@@ -2848,7 +2994,7 @@
         <a:buFontTx/>
         <a:buChar char="•"/>
         <a:tabLst/>
-        <a:defRPr b="0" baseline="0" cap="none" i="0" spc="0" strike="noStrike" sz="5200" u="none">
+        <a:defRPr sz="5200" b="0" i="0" u="none" strike="noStrike" cap="none" spc="0" baseline="0">
           <a:ln>
             <a:noFill/>
           </a:ln>
@@ -2877,7 +3023,7 @@
         <a:buFontTx/>
         <a:buChar char="•"/>
         <a:tabLst/>
-        <a:defRPr b="0" baseline="0" cap="none" i="0" spc="0" strike="noStrike" sz="5200" u="none">
+        <a:defRPr sz="5200" b="0" i="0" u="none" strike="noStrike" cap="none" spc="0" baseline="0">
           <a:ln>
             <a:noFill/>
           </a:ln>
@@ -2906,7 +3052,7 @@
         <a:buFontTx/>
         <a:buChar char="•"/>
         <a:tabLst/>
-        <a:defRPr b="0" baseline="0" cap="none" i="0" spc="0" strike="noStrike" sz="5200" u="none">
+        <a:defRPr sz="5200" b="0" i="0" u="none" strike="noStrike" cap="none" spc="0" baseline="0">
           <a:ln>
             <a:noFill/>
           </a:ln>
@@ -2935,7 +3081,7 @@
         <a:buFontTx/>
         <a:buChar char="•"/>
         <a:tabLst/>
-        <a:defRPr b="0" baseline="0" cap="none" i="0" spc="0" strike="noStrike" sz="5200" u="none">
+        <a:defRPr sz="5200" b="0" i="0" u="none" strike="noStrike" cap="none" spc="0" baseline="0">
           <a:ln>
             <a:noFill/>
           </a:ln>
@@ -2964,7 +3110,7 @@
         <a:buFontTx/>
         <a:buChar char="•"/>
         <a:tabLst/>
-        <a:defRPr b="0" baseline="0" cap="none" i="0" spc="0" strike="noStrike" sz="5200" u="none">
+        <a:defRPr sz="5200" b="0" i="0" u="none" strike="noStrike" cap="none" spc="0" baseline="0">
           <a:ln>
             <a:noFill/>
           </a:ln>
@@ -2993,7 +3139,7 @@
         <a:buFontTx/>
         <a:buChar char="•"/>
         <a:tabLst/>
-        <a:defRPr b="0" baseline="0" cap="none" i="0" spc="0" strike="noStrike" sz="5200" u="none">
+        <a:defRPr sz="5200" b="0" i="0" u="none" strike="noStrike" cap="none" spc="0" baseline="0">
           <a:ln>
             <a:noFill/>
           </a:ln>
@@ -3022,7 +3168,7 @@
         <a:buFontTx/>
         <a:buChar char="•"/>
         <a:tabLst/>
-        <a:defRPr b="0" baseline="0" cap="none" i="0" spc="0" strike="noStrike" sz="5200" u="none">
+        <a:defRPr sz="5200" b="0" i="0" u="none" strike="noStrike" cap="none" spc="0" baseline="0">
           <a:ln>
             <a:noFill/>
           </a:ln>
@@ -3051,7 +3197,7 @@
         <a:buFontTx/>
         <a:buChar char="•"/>
         <a:tabLst/>
-        <a:defRPr b="0" baseline="0" cap="none" i="0" spc="0" strike="noStrike" sz="5200" u="none">
+        <a:defRPr sz="5200" b="0" i="0" u="none" strike="noStrike" cap="none" spc="0" baseline="0">
           <a:ln>
             <a:noFill/>
           </a:ln>
@@ -3082,7 +3228,7 @@
         <a:buFontTx/>
         <a:buNone/>
         <a:tabLst/>
-        <a:defRPr b="0" baseline="0" cap="none" i="0" spc="0" strike="noStrike" sz="2400" u="none">
+        <a:defRPr sz="2400" b="0" i="0" u="none" strike="noStrike" cap="none" spc="0" baseline="0">
           <a:ln>
             <a:noFill/>
           </a:ln>
@@ -3111,7 +3257,7 @@
         <a:buFontTx/>
         <a:buNone/>
         <a:tabLst/>
-        <a:defRPr b="0" baseline="0" cap="none" i="0" spc="0" strike="noStrike" sz="2400" u="none">
+        <a:defRPr sz="2400" b="0" i="0" u="none" strike="noStrike" cap="none" spc="0" baseline="0">
           <a:ln>
             <a:noFill/>
           </a:ln>
@@ -3140,7 +3286,7 @@
         <a:buFontTx/>
         <a:buNone/>
         <a:tabLst/>
-        <a:defRPr b="0" baseline="0" cap="none" i="0" spc="0" strike="noStrike" sz="2400" u="none">
+        <a:defRPr sz="2400" b="0" i="0" u="none" strike="noStrike" cap="none" spc="0" baseline="0">
           <a:ln>
             <a:noFill/>
           </a:ln>
@@ -3169,7 +3315,7 @@
         <a:buFontTx/>
         <a:buNone/>
         <a:tabLst/>
-        <a:defRPr b="0" baseline="0" cap="none" i="0" spc="0" strike="noStrike" sz="2400" u="none">
+        <a:defRPr sz="2400" b="0" i="0" u="none" strike="noStrike" cap="none" spc="0" baseline="0">
           <a:ln>
             <a:noFill/>
           </a:ln>
@@ -3198,7 +3344,7 @@
         <a:buFontTx/>
         <a:buNone/>
         <a:tabLst/>
-        <a:defRPr b="0" baseline="0" cap="none" i="0" spc="0" strike="noStrike" sz="2400" u="none">
+        <a:defRPr sz="2400" b="0" i="0" u="none" strike="noStrike" cap="none" spc="0" baseline="0">
           <a:ln>
             <a:noFill/>
           </a:ln>
@@ -3227,7 +3373,7 @@
         <a:buFontTx/>
         <a:buNone/>
         <a:tabLst/>
-        <a:defRPr b="0" baseline="0" cap="none" i="0" spc="0" strike="noStrike" sz="2400" u="none">
+        <a:defRPr sz="2400" b="0" i="0" u="none" strike="noStrike" cap="none" spc="0" baseline="0">
           <a:ln>
             <a:noFill/>
           </a:ln>
@@ -3256,7 +3402,7 @@
         <a:buFontTx/>
         <a:buNone/>
         <a:tabLst/>
-        <a:defRPr b="0" baseline="0" cap="none" i="0" spc="0" strike="noStrike" sz="2400" u="none">
+        <a:defRPr sz="2400" b="0" i="0" u="none" strike="noStrike" cap="none" spc="0" baseline="0">
           <a:ln>
             <a:noFill/>
           </a:ln>
@@ -3285,7 +3431,7 @@
         <a:buFontTx/>
         <a:buNone/>
         <a:tabLst/>
-        <a:defRPr b="0" baseline="0" cap="none" i="0" spc="0" strike="noStrike" sz="2400" u="none">
+        <a:defRPr sz="2400" b="0" i="0" u="none" strike="noStrike" cap="none" spc="0" baseline="0">
           <a:ln>
             <a:noFill/>
           </a:ln>
@@ -3314,7 +3460,7 @@
         <a:buFontTx/>
         <a:buNone/>
         <a:tabLst/>
-        <a:defRPr b="0" baseline="0" cap="none" i="0" spc="0" strike="noStrike" sz="2400" u="none">
+        <a:defRPr sz="2400" b="0" i="0" u="none" strike="noStrike" cap="none" spc="0" baseline="0">
           <a:ln>
             <a:noFill/>
           </a:ln>
@@ -3334,7 +3480,7 @@
 </file>
 
 <file path=ppt/slides/slide1.xml><?xml version="1.0" encoding="utf-8"?>
-<p:sld xmlns:a="http://schemas.openxmlformats.org/drawingml/2006/main" xmlns:r="http://schemas.openxmlformats.org/officeDocument/2006/relationships" xmlns:p="http://schemas.openxmlformats.org/presentationml/2006/main" showMasterSp="1" showMasterPhAnim="1">
+<p:sld xmlns:a="http://schemas.openxmlformats.org/drawingml/2006/main" xmlns:r="http://schemas.openxmlformats.org/officeDocument/2006/relationships" xmlns:p="http://schemas.openxmlformats.org/presentationml/2006/main">
   <p:cSld>
     <p:spTree>
       <p:nvGrpSpPr>
@@ -3384,12 +3530,12 @@
   <p:clrMapOvr>
     <a:masterClrMapping/>
   </p:clrMapOvr>
-  <p:transition xmlns:p14="http://schemas.microsoft.com/office/powerpoint/2010/main" spd="med" advClick="1"/>
+  <p:transition spd="med"/>
 </p:sld>
 </file>
 
 <file path=ppt/slides/slide10.xml><?xml version="1.0" encoding="utf-8"?>
-<p:sld xmlns:a="http://schemas.openxmlformats.org/drawingml/2006/main" xmlns:r="http://schemas.openxmlformats.org/officeDocument/2006/relationships" xmlns:p="http://schemas.openxmlformats.org/presentationml/2006/main" showMasterSp="1" showMasterPhAnim="1">
+<p:sld xmlns:a="http://schemas.openxmlformats.org/drawingml/2006/main" xmlns:r="http://schemas.openxmlformats.org/officeDocument/2006/relationships" xmlns:p="http://schemas.openxmlformats.org/presentationml/2006/main">
   <p:cSld>
     <p:spTree>
       <p:nvGrpSpPr>
@@ -3408,7 +3554,9 @@
       <p:sp>
         <p:nvSpPr>
           <p:cNvPr id="187" name="Shape 187"/>
-          <p:cNvSpPr/>
+          <p:cNvSpPr>
+            <a:spLocks noGrp="1"/>
+          </p:cNvSpPr>
           <p:nvPr>
             <p:ph type="title"/>
           </p:nvPr>
@@ -3422,7 +3570,6 @@
           <a:bodyPr/>
           <a:lstStyle/>
           <a:p>
-            <a:pPr/>
             <a:r>
               <a:t>In summary…</a:t>
             </a:r>
@@ -3432,7 +3579,9 @@
       <p:sp>
         <p:nvSpPr>
           <p:cNvPr id="188" name="Shape 188"/>
-          <p:cNvSpPr/>
+          <p:cNvSpPr>
+            <a:spLocks noGrp="1"/>
+          </p:cNvSpPr>
           <p:nvPr>
             <p:ph type="body" idx="1"/>
           </p:nvPr>
@@ -3446,25 +3595,21 @@
           <a:bodyPr/>
           <a:lstStyle/>
           <a:p>
-            <a:pPr/>
             <a:r>
               <a:t>Simply transition your monolith applications to microservices</a:t>
             </a:r>
           </a:p>
           <a:p>
-            <a:pPr/>
             <a:r>
               <a:t>No need to learn any new frameworks</a:t>
             </a:r>
           </a:p>
           <a:p>
-            <a:pPr/>
             <a:r>
               <a:t>You’re in complete control of what components you use</a:t>
             </a:r>
           </a:p>
           <a:p>
-            <a:pPr/>
             <a:r>
               <a:t>Run and scale anywhere</a:t>
             </a:r>
@@ -3476,12 +3621,12 @@
   <p:clrMapOvr>
     <a:masterClrMapping/>
   </p:clrMapOvr>
-  <p:transition xmlns:p14="http://schemas.microsoft.com/office/powerpoint/2010/main" spd="med" advClick="1" p14:dur="1000"/>
+  <p:transition spd="slow"/>
 </p:sld>
 </file>
 
 <file path=ppt/slides/slide11.xml><?xml version="1.0" encoding="utf-8"?>
-<p:sld xmlns:a="http://schemas.openxmlformats.org/drawingml/2006/main" xmlns:r="http://schemas.openxmlformats.org/officeDocument/2006/relationships" xmlns:p="http://schemas.openxmlformats.org/presentationml/2006/main" showMasterSp="1" showMasterPhAnim="1">
+<p:sld xmlns:a="http://schemas.openxmlformats.org/drawingml/2006/main" xmlns:r="http://schemas.openxmlformats.org/officeDocument/2006/relationships" xmlns:p="http://schemas.openxmlformats.org/presentationml/2006/main">
   <p:cSld>
     <p:spTree>
       <p:nvGrpSpPr>
@@ -3500,7 +3645,9 @@
       <p:sp>
         <p:nvSpPr>
           <p:cNvPr id="190" name="Shape 190"/>
-          <p:cNvSpPr/>
+          <p:cNvSpPr>
+            <a:spLocks noGrp="1"/>
+          </p:cNvSpPr>
           <p:nvPr>
             <p:ph type="body" idx="1"/>
           </p:nvPr>
@@ -3514,16 +3661,14 @@
           <a:bodyPr/>
           <a:lstStyle/>
           <a:p>
-            <a:pPr/>
             <a:r>
               <a:t>https://ee.kumuluz.com</a:t>
             </a:r>
           </a:p>
           <a:p>
-            <a:pPr/>
             <a:r>
               <a:rPr u="sng">
-                <a:hlinkClick r:id="rId2" invalidUrl="" action="" tgtFrame="" tooltip="" history="1" highlightClick="0" endSnd="0"/>
+                <a:hlinkClick r:id="rId2"/>
               </a:rPr>
               <a:t>https://github.com/tfaga/kumuluzee</a:t>
             </a:r>
@@ -3535,12 +3680,12 @@
   <p:clrMapOvr>
     <a:masterClrMapping/>
   </p:clrMapOvr>
-  <p:transition xmlns:p14="http://schemas.microsoft.com/office/powerpoint/2010/main" spd="med" advClick="1" p14:dur="1000"/>
+  <p:transition spd="slow"/>
 </p:sld>
 </file>
 
 <file path=ppt/slides/slide2.xml><?xml version="1.0" encoding="utf-8"?>
-<p:sld xmlns:a="http://schemas.openxmlformats.org/drawingml/2006/main" xmlns:r="http://schemas.openxmlformats.org/officeDocument/2006/relationships" xmlns:p="http://schemas.openxmlformats.org/presentationml/2006/main" showMasterSp="1" showMasterPhAnim="1">
+<p:sld xmlns:a="http://schemas.openxmlformats.org/drawingml/2006/main" xmlns:r="http://schemas.openxmlformats.org/officeDocument/2006/relationships" xmlns:p="http://schemas.openxmlformats.org/presentationml/2006/main">
   <p:cSld>
     <p:spTree>
       <p:nvGrpSpPr>
@@ -3559,7 +3704,9 @@
       <p:sp>
         <p:nvSpPr>
           <p:cNvPr id="121" name="Shape 121"/>
-          <p:cNvSpPr/>
+          <p:cNvSpPr>
+            <a:spLocks noGrp="1"/>
+          </p:cNvSpPr>
           <p:nvPr>
             <p:ph type="title"/>
           </p:nvPr>
@@ -3573,7 +3720,6 @@
           <a:bodyPr/>
           <a:lstStyle/>
           <a:p>
-            <a:pPr/>
             <a:r>
               <a:t>Kumuluzee</a:t>
             </a:r>
@@ -3583,7 +3729,9 @@
       <p:sp>
         <p:nvSpPr>
           <p:cNvPr id="122" name="Shape 122"/>
-          <p:cNvSpPr/>
+          <p:cNvSpPr>
+            <a:spLocks noGrp="1"/>
+          </p:cNvSpPr>
           <p:nvPr>
             <p:ph type="body" idx="1"/>
           </p:nvPr>
@@ -3594,7 +3742,9 @@
           </a:prstGeom>
         </p:spPr>
         <p:txBody>
-          <a:bodyPr/>
+          <a:bodyPr>
+            <a:normAutofit lnSpcReduction="10000"/>
+          </a:bodyPr>
           <a:lstStyle/>
           <a:p>
             <a:pPr marL="655573" indent="-655573" defTabSz="734694">
@@ -3658,12 +3808,12 @@
   <p:clrMapOvr>
     <a:masterClrMapping/>
   </p:clrMapOvr>
-  <p:transition xmlns:p14="http://schemas.microsoft.com/office/powerpoint/2010/main" spd="med" advClick="1" p14:dur="1000"/>
+  <p:transition spd="slow"/>
 </p:sld>
 </file>
 
 <file path=ppt/slides/slide3.xml><?xml version="1.0" encoding="utf-8"?>
-<p:sld xmlns:a="http://schemas.openxmlformats.org/drawingml/2006/main" xmlns:r="http://schemas.openxmlformats.org/officeDocument/2006/relationships" xmlns:p="http://schemas.openxmlformats.org/presentationml/2006/main" showMasterSp="1" showMasterPhAnim="1">
+<p:sld xmlns:a="http://schemas.openxmlformats.org/drawingml/2006/main" xmlns:r="http://schemas.openxmlformats.org/officeDocument/2006/relationships" xmlns:p="http://schemas.openxmlformats.org/presentationml/2006/main">
   <p:cSld>
     <p:spTree>
       <p:nvGrpSpPr>
@@ -3682,7 +3832,9 @@
       <p:sp>
         <p:nvSpPr>
           <p:cNvPr id="126" name="Shape 126"/>
-          <p:cNvSpPr/>
+          <p:cNvSpPr>
+            <a:spLocks noGrp="1"/>
+          </p:cNvSpPr>
           <p:nvPr>
             <p:ph type="title"/>
           </p:nvPr>
@@ -3696,7 +3848,6 @@
           <a:bodyPr/>
           <a:lstStyle/>
           <a:p>
-            <a:pPr/>
             <a:r>
               <a:t>Great fit for microservices</a:t>
             </a:r>
@@ -3706,7 +3857,9 @@
       <p:sp>
         <p:nvSpPr>
           <p:cNvPr id="127" name="Shape 127"/>
-          <p:cNvSpPr/>
+          <p:cNvSpPr>
+            <a:spLocks noGrp="1"/>
+          </p:cNvSpPr>
           <p:nvPr>
             <p:ph type="body" idx="1"/>
           </p:nvPr>
@@ -3717,16 +3870,16 @@
           </a:prstGeom>
         </p:spPr>
         <p:txBody>
-          <a:bodyPr/>
+          <a:bodyPr>
+            <a:normAutofit fontScale="92500"/>
+          </a:bodyPr>
           <a:lstStyle/>
           <a:p>
-            <a:pPr/>
             <a:r>
               <a:t>Dependency driven - simple to use</a:t>
             </a:r>
           </a:p>
           <a:p>
-            <a:pPr/>
             <a:r>
               <a:t>Pick and choose the Java EE components you want</a:t>
             </a:r>
@@ -3738,13 +3891,11 @@
             </a:r>
           </a:p>
           <a:p>
-            <a:pPr/>
             <a:r>
               <a:t>Final packages (JARs) include only what they need - lightweight</a:t>
             </a:r>
           </a:p>
           <a:p>
-            <a:pPr/>
             <a:r>
               <a:t>Ideal for running in PaaS and Docker-like environments</a:t>
             </a:r>
@@ -3756,12 +3907,12 @@
   <p:clrMapOvr>
     <a:masterClrMapping/>
   </p:clrMapOvr>
-  <p:transition xmlns:p14="http://schemas.microsoft.com/office/powerpoint/2010/main" spd="med" advClick="1" p14:dur="1000"/>
+  <p:transition spd="slow"/>
 </p:sld>
 </file>
 
 <file path=ppt/slides/slide4.xml><?xml version="1.0" encoding="utf-8"?>
-<p:sld xmlns:a="http://schemas.openxmlformats.org/drawingml/2006/main" xmlns:r="http://schemas.openxmlformats.org/officeDocument/2006/relationships" xmlns:p="http://schemas.openxmlformats.org/presentationml/2006/main" showMasterSp="1" showMasterPhAnim="1">
+<p:sld xmlns:a="http://schemas.openxmlformats.org/drawingml/2006/main" xmlns:r="http://schemas.openxmlformats.org/officeDocument/2006/relationships" xmlns:p="http://schemas.openxmlformats.org/presentationml/2006/main">
   <p:cSld>
     <p:spTree>
       <p:nvGrpSpPr>
@@ -3780,7 +3931,9 @@
       <p:sp>
         <p:nvSpPr>
           <p:cNvPr id="131" name="Shape 131"/>
-          <p:cNvSpPr/>
+          <p:cNvSpPr>
+            <a:spLocks noGrp="1"/>
+          </p:cNvSpPr>
           <p:nvPr>
             <p:ph type="body" idx="1"/>
           </p:nvPr>
@@ -3791,10 +3944,11 @@
           </a:prstGeom>
         </p:spPr>
         <p:txBody>
-          <a:bodyPr/>
+          <a:bodyPr>
+            <a:normAutofit lnSpcReduction="10000"/>
+          </a:bodyPr>
           <a:lstStyle/>
           <a:p>
-            <a:pPr/>
             <a:r>
               <a:t>Support for multiple containers. Choose the one you want</a:t>
             </a:r>
@@ -3806,7 +3960,6 @@
             </a:r>
           </a:p>
           <a:p>
-            <a:pPr/>
             <a:r>
               <a:t>Many Java EE components:</a:t>
             </a:r>
@@ -3830,12 +3983,12 @@
   <p:clrMapOvr>
     <a:masterClrMapping/>
   </p:clrMapOvr>
-  <p:transition xmlns:p14="http://schemas.microsoft.com/office/powerpoint/2010/main" spd="med" advClick="1" p14:dur="1000"/>
+  <p:transition spd="slow"/>
 </p:sld>
 </file>
 
 <file path=ppt/slides/slide5.xml><?xml version="1.0" encoding="utf-8"?>
-<p:sld xmlns:a="http://schemas.openxmlformats.org/drawingml/2006/main" xmlns:r="http://schemas.openxmlformats.org/officeDocument/2006/relationships" xmlns:p="http://schemas.openxmlformats.org/presentationml/2006/main" showMasterSp="1" showMasterPhAnim="1">
+<p:sld xmlns:a="http://schemas.openxmlformats.org/drawingml/2006/main" xmlns:r="http://schemas.openxmlformats.org/officeDocument/2006/relationships" xmlns:p="http://schemas.openxmlformats.org/presentationml/2006/main">
   <p:cSld>
     <p:spTree>
       <p:nvGrpSpPr>
@@ -3909,7 +4062,7 @@
             <a:miter lim="400000"/>
           </a:ln>
           <a:effectLst>
-            <a:outerShdw sx="100000" sy="100000" kx="0" ky="0" algn="b" rotWithShape="0" blurRad="63500" dist="38100" dir="5400000">
+            <a:outerShdw blurRad="63500" dist="38100" dir="5400000" rotWithShape="0">
               <a:srgbClr val="000000">
                 <a:alpha val="50000"/>
               </a:srgbClr>
@@ -3917,7 +4070,7 @@
           </a:effectLst>
           <a:extLst>
             <a:ext uri="{C572A759-6A51-4108-AA02-DFA0A04FC94B}">
-              <ma14:wrappingTextBoxFlag xmlns:ma14="http://schemas.microsoft.com/office/mac/drawingml/2011/main" val="1"/>
+              <ma14:wrappingTextBoxFlag xmlns:ma14="http://schemas.microsoft.com/office/mac/drawingml/2011/main" xmlns="" val="1"/>
             </a:ext>
           </a:extLst>
         </p:spPr>
@@ -3937,7 +4090,6 @@
             </a:lvl1pPr>
           </a:lstStyle>
           <a:p>
-            <a:pPr/>
             <a:r>
               <a:t>Jetty</a:t>
             </a:r>
@@ -3983,6 +4135,7 @@
                 <a:sym typeface="Helvetica Light"/>
               </a:defRPr>
             </a:pPr>
+            <a:endParaRPr/>
           </a:p>
         </p:txBody>
       </p:sp>
@@ -4007,7 +4160,7 @@
             <a:miter lim="400000"/>
           </a:ln>
           <a:effectLst>
-            <a:outerShdw sx="100000" sy="100000" kx="0" ky="0" algn="b" rotWithShape="0" blurRad="38100" dist="25400" dir="5400000">
+            <a:outerShdw blurRad="38100" dist="25400" dir="5400000" rotWithShape="0">
               <a:srgbClr val="000000">
                 <a:alpha val="50000"/>
               </a:srgbClr>
@@ -4015,7 +4168,7 @@
           </a:effectLst>
           <a:extLst>
             <a:ext uri="{C572A759-6A51-4108-AA02-DFA0A04FC94B}">
-              <ma14:wrappingTextBoxFlag xmlns:ma14="http://schemas.microsoft.com/office/mac/drawingml/2011/main" val="1"/>
+              <ma14:wrappingTextBoxFlag xmlns:ma14="http://schemas.microsoft.com/office/mac/drawingml/2011/main" xmlns="" val="1"/>
             </a:ext>
           </a:extLst>
         </p:spPr>
@@ -4035,7 +4188,6 @@
             </a:lvl1pPr>
           </a:lstStyle>
           <a:p>
-            <a:pPr/>
             <a:r>
               <a:t>JPA</a:t>
             </a:r>
@@ -4063,7 +4215,7 @@
             <a:miter lim="400000"/>
           </a:ln>
           <a:effectLst>
-            <a:outerShdw sx="100000" sy="100000" kx="0" ky="0" algn="b" rotWithShape="0" blurRad="38100" dist="25400" dir="5400000">
+            <a:outerShdw blurRad="38100" dist="25400" dir="5400000" rotWithShape="0">
               <a:srgbClr val="000000">
                 <a:alpha val="50000"/>
               </a:srgbClr>
@@ -4071,7 +4223,7 @@
           </a:effectLst>
           <a:extLst>
             <a:ext uri="{C572A759-6A51-4108-AA02-DFA0A04FC94B}">
-              <ma14:wrappingTextBoxFlag xmlns:ma14="http://schemas.microsoft.com/office/mac/drawingml/2011/main" val="1"/>
+              <ma14:wrappingTextBoxFlag xmlns:ma14="http://schemas.microsoft.com/office/mac/drawingml/2011/main" xmlns="" val="1"/>
             </a:ext>
           </a:extLst>
         </p:spPr>
@@ -4091,7 +4243,6 @@
             </a:lvl1pPr>
           </a:lstStyle>
           <a:p>
-            <a:pPr/>
             <a:r>
               <a:t>CDI</a:t>
             </a:r>
@@ -4119,7 +4270,7 @@
             <a:miter lim="400000"/>
           </a:ln>
           <a:effectLst>
-            <a:outerShdw sx="100000" sy="100000" kx="0" ky="0" algn="b" rotWithShape="0" blurRad="25400" dist="25400" dir="2388334">
+            <a:outerShdw blurRad="25400" dist="25400" dir="2388334" rotWithShape="0">
               <a:srgbClr val="000000">
                 <a:alpha val="79310"/>
               </a:srgbClr>
@@ -4127,7 +4278,7 @@
           </a:effectLst>
           <a:extLst>
             <a:ext uri="{C572A759-6A51-4108-AA02-DFA0A04FC94B}">
-              <ma14:wrappingTextBoxFlag xmlns:ma14="http://schemas.microsoft.com/office/mac/drawingml/2011/main" val="1"/>
+              <ma14:wrappingTextBoxFlag xmlns:ma14="http://schemas.microsoft.com/office/mac/drawingml/2011/main" xmlns="" val="1"/>
             </a:ext>
           </a:extLst>
         </p:spPr>
@@ -4147,7 +4298,6 @@
             </a:lvl1pPr>
           </a:lstStyle>
           <a:p>
-            <a:pPr/>
             <a:r>
               <a:t>JSF</a:t>
             </a:r>
@@ -4212,7 +4362,7 @@
             <a:miter lim="400000"/>
           </a:ln>
           <a:effectLst>
-            <a:outerShdw sx="100000" sy="100000" kx="0" ky="0" algn="b" rotWithShape="0" blurRad="63500" dist="38100" dir="5400000">
+            <a:outerShdw blurRad="63500" dist="38100" dir="5400000" rotWithShape="0">
               <a:srgbClr val="000000">
                 <a:alpha val="50000"/>
               </a:srgbClr>
@@ -4220,7 +4370,7 @@
           </a:effectLst>
           <a:extLst>
             <a:ext uri="{C572A759-6A51-4108-AA02-DFA0A04FC94B}">
-              <ma14:wrappingTextBoxFlag xmlns:ma14="http://schemas.microsoft.com/office/mac/drawingml/2011/main" val="1"/>
+              <ma14:wrappingTextBoxFlag xmlns:ma14="http://schemas.microsoft.com/office/mac/drawingml/2011/main" xmlns="" val="1"/>
             </a:ext>
           </a:extLst>
         </p:spPr>
@@ -4240,7 +4390,6 @@
             </a:lvl1pPr>
           </a:lstStyle>
           <a:p>
-            <a:pPr/>
             <a:r>
               <a:t>Jetty</a:t>
             </a:r>
@@ -4286,6 +4435,7 @@
                 <a:sym typeface="Helvetica Light"/>
               </a:defRPr>
             </a:pPr>
+            <a:endParaRPr/>
           </a:p>
         </p:txBody>
       </p:sp>
@@ -4310,7 +4460,7 @@
             <a:miter lim="400000"/>
           </a:ln>
           <a:effectLst>
-            <a:outerShdw sx="100000" sy="100000" kx="0" ky="0" algn="b" rotWithShape="0" blurRad="38100" dist="25400" dir="5400000">
+            <a:outerShdw blurRad="38100" dist="25400" dir="5400000" rotWithShape="0">
               <a:srgbClr val="000000">
                 <a:alpha val="50000"/>
               </a:srgbClr>
@@ -4318,7 +4468,7 @@
           </a:effectLst>
           <a:extLst>
             <a:ext uri="{C572A759-6A51-4108-AA02-DFA0A04FC94B}">
-              <ma14:wrappingTextBoxFlag xmlns:ma14="http://schemas.microsoft.com/office/mac/drawingml/2011/main" val="1"/>
+              <ma14:wrappingTextBoxFlag xmlns:ma14="http://schemas.microsoft.com/office/mac/drawingml/2011/main" xmlns="" val="1"/>
             </a:ext>
           </a:extLst>
         </p:spPr>
@@ -4338,7 +4488,6 @@
             </a:lvl1pPr>
           </a:lstStyle>
           <a:p>
-            <a:pPr/>
             <a:r>
               <a:t>JPA</a:t>
             </a:r>
@@ -4366,7 +4515,7 @@
             <a:miter lim="400000"/>
           </a:ln>
           <a:effectLst>
-            <a:outerShdw sx="100000" sy="100000" kx="0" ky="0" algn="b" rotWithShape="0" blurRad="38100" dist="25400" dir="5400000">
+            <a:outerShdw blurRad="38100" dist="25400" dir="5400000" rotWithShape="0">
               <a:srgbClr val="000000">
                 <a:alpha val="50000"/>
               </a:srgbClr>
@@ -4374,7 +4523,7 @@
           </a:effectLst>
           <a:extLst>
             <a:ext uri="{C572A759-6A51-4108-AA02-DFA0A04FC94B}">
-              <ma14:wrappingTextBoxFlag xmlns:ma14="http://schemas.microsoft.com/office/mac/drawingml/2011/main" val="1"/>
+              <ma14:wrappingTextBoxFlag xmlns:ma14="http://schemas.microsoft.com/office/mac/drawingml/2011/main" xmlns="" val="1"/>
             </a:ext>
           </a:extLst>
         </p:spPr>
@@ -4394,7 +4543,6 @@
             </a:lvl1pPr>
           </a:lstStyle>
           <a:p>
-            <a:pPr/>
             <a:r>
               <a:t>CDI</a:t>
             </a:r>
@@ -4422,7 +4570,7 @@
             <a:miter lim="400000"/>
           </a:ln>
           <a:effectLst>
-            <a:outerShdw sx="100000" sy="100000" kx="0" ky="0" algn="b" rotWithShape="0" blurRad="25400" dist="25400" dir="2388334">
+            <a:outerShdw blurRad="25400" dist="25400" dir="2388334" rotWithShape="0">
               <a:srgbClr val="000000">
                 <a:alpha val="79310"/>
               </a:srgbClr>
@@ -4430,7 +4578,7 @@
           </a:effectLst>
           <a:extLst>
             <a:ext uri="{C572A759-6A51-4108-AA02-DFA0A04FC94B}">
-              <ma14:wrappingTextBoxFlag xmlns:ma14="http://schemas.microsoft.com/office/mac/drawingml/2011/main" val="1"/>
+              <ma14:wrappingTextBoxFlag xmlns:ma14="http://schemas.microsoft.com/office/mac/drawingml/2011/main" xmlns="" val="1"/>
             </a:ext>
           </a:extLst>
         </p:spPr>
@@ -4450,8 +4598,8 @@
             </a:lvl1pPr>
           </a:lstStyle>
           <a:p>
-            <a:pPr/>
-            <a:r>
+            <a:r>
+              <a:rPr sz="3600" dirty="0"/>
               <a:t>JAX-RS</a:t>
             </a:r>
           </a:p>
@@ -4486,7 +4634,7 @@
             <a:miter lim="400000"/>
           </a:ln>
           <a:effectLst>
-            <a:outerShdw sx="100000" sy="100000" kx="0" ky="0" algn="b" rotWithShape="0" blurRad="63500" dist="38100" dir="5400000">
+            <a:outerShdw blurRad="63500" dist="38100" dir="5400000" rotWithShape="0">
               <a:srgbClr val="000000">
                 <a:alpha val="50000"/>
               </a:srgbClr>
@@ -4494,7 +4642,7 @@
           </a:effectLst>
           <a:extLst>
             <a:ext uri="{C572A759-6A51-4108-AA02-DFA0A04FC94B}">
-              <ma14:wrappingTextBoxFlag xmlns:ma14="http://schemas.microsoft.com/office/mac/drawingml/2011/main" val="1"/>
+              <ma14:wrappingTextBoxFlag xmlns:ma14="http://schemas.microsoft.com/office/mac/drawingml/2011/main" xmlns="" val="1"/>
             </a:ext>
           </a:extLst>
         </p:spPr>
@@ -4514,7 +4662,6 @@
             </a:lvl1pPr>
           </a:lstStyle>
           <a:p>
-            <a:pPr/>
             <a:r>
               <a:t>Jetty</a:t>
             </a:r>
@@ -4560,6 +4707,7 @@
                 <a:sym typeface="Helvetica Light"/>
               </a:defRPr>
             </a:pPr>
+            <a:endParaRPr/>
           </a:p>
         </p:txBody>
       </p:sp>
@@ -4584,7 +4732,7 @@
             <a:miter lim="400000"/>
           </a:ln>
           <a:effectLst>
-            <a:outerShdw sx="100000" sy="100000" kx="0" ky="0" algn="b" rotWithShape="0" blurRad="38100" dist="25400" dir="5400000">
+            <a:outerShdw blurRad="38100" dist="25400" dir="5400000" rotWithShape="0">
               <a:srgbClr val="000000">
                 <a:alpha val="50000"/>
               </a:srgbClr>
@@ -4592,7 +4740,7 @@
           </a:effectLst>
           <a:extLst>
             <a:ext uri="{C572A759-6A51-4108-AA02-DFA0A04FC94B}">
-              <ma14:wrappingTextBoxFlag xmlns:ma14="http://schemas.microsoft.com/office/mac/drawingml/2011/main" val="1"/>
+              <ma14:wrappingTextBoxFlag xmlns:ma14="http://schemas.microsoft.com/office/mac/drawingml/2011/main" xmlns="" val="1"/>
             </a:ext>
           </a:extLst>
         </p:spPr>
@@ -4612,7 +4760,6 @@
             </a:lvl1pPr>
           </a:lstStyle>
           <a:p>
-            <a:pPr/>
             <a:r>
               <a:t>JPA</a:t>
             </a:r>
@@ -4640,7 +4787,7 @@
             <a:miter lim="400000"/>
           </a:ln>
           <a:effectLst>
-            <a:outerShdw sx="100000" sy="100000" kx="0" ky="0" algn="b" rotWithShape="0" blurRad="25400" dist="25400" dir="2388334">
+            <a:outerShdw blurRad="25400" dist="25400" dir="2388334" rotWithShape="0">
               <a:srgbClr val="000000">
                 <a:alpha val="79310"/>
               </a:srgbClr>
@@ -4648,7 +4795,7 @@
           </a:effectLst>
           <a:extLst>
             <a:ext uri="{C572A759-6A51-4108-AA02-DFA0A04FC94B}">
-              <ma14:wrappingTextBoxFlag xmlns:ma14="http://schemas.microsoft.com/office/mac/drawingml/2011/main" val="1"/>
+              <ma14:wrappingTextBoxFlag xmlns:ma14="http://schemas.microsoft.com/office/mac/drawingml/2011/main" xmlns="" val="1"/>
             </a:ext>
           </a:extLst>
         </p:spPr>
@@ -4668,8 +4815,8 @@
             </a:lvl1pPr>
           </a:lstStyle>
           <a:p>
-            <a:pPr/>
-            <a:r>
+            <a:r>
+              <a:rPr sz="3600" dirty="0"/>
               <a:t>JAX-RS</a:t>
             </a:r>
           </a:p>
@@ -4696,7 +4843,7 @@
             <a:miter lim="400000"/>
           </a:ln>
           <a:effectLst>
-            <a:outerShdw sx="100000" sy="100000" kx="0" ky="0" algn="b" rotWithShape="0" blurRad="25400" dist="25400" dir="2388334">
+            <a:outerShdw blurRad="25400" dist="25400" dir="2388334" rotWithShape="0">
               <a:srgbClr val="000000">
                 <a:alpha val="79310"/>
               </a:srgbClr>
@@ -4704,7 +4851,7 @@
           </a:effectLst>
           <a:extLst>
             <a:ext uri="{C572A759-6A51-4108-AA02-DFA0A04FC94B}">
-              <ma14:wrappingTextBoxFlag xmlns:ma14="http://schemas.microsoft.com/office/mac/drawingml/2011/main" val="1"/>
+              <ma14:wrappingTextBoxFlag xmlns:ma14="http://schemas.microsoft.com/office/mac/drawingml/2011/main" xmlns="" val="1"/>
             </a:ext>
           </a:extLst>
         </p:spPr>
@@ -4724,7 +4871,6 @@
             </a:lvl1pPr>
           </a:lstStyle>
           <a:p>
-            <a:pPr/>
             <a:r>
               <a:t>JSP</a:t>
             </a:r>
@@ -4750,7 +4896,7 @@
           </a:ln>
           <a:extLst>
             <a:ext uri="{C572A759-6A51-4108-AA02-DFA0A04FC94B}">
-              <ma14:wrappingTextBoxFlag xmlns:ma14="http://schemas.microsoft.com/office/mac/drawingml/2011/main" val="1"/>
+              <ma14:wrappingTextBoxFlag xmlns:ma14="http://schemas.microsoft.com/office/mac/drawingml/2011/main" xmlns="" val="1"/>
             </a:ext>
           </a:extLst>
         </p:spPr>
@@ -4760,7 +4906,6 @@
           </a:bodyPr>
           <a:lstStyle/>
           <a:p>
-            <a:pPr/>
             <a:r>
               <a:t>Microservice 1</a:t>
             </a:r>
@@ -4786,7 +4931,7 @@
           </a:ln>
           <a:extLst>
             <a:ext uri="{C572A759-6A51-4108-AA02-DFA0A04FC94B}">
-              <ma14:wrappingTextBoxFlag xmlns:ma14="http://schemas.microsoft.com/office/mac/drawingml/2011/main" val="1"/>
+              <ma14:wrappingTextBoxFlag xmlns:ma14="http://schemas.microsoft.com/office/mac/drawingml/2011/main" xmlns="" val="1"/>
             </a:ext>
           </a:extLst>
         </p:spPr>
@@ -4796,7 +4941,6 @@
           </a:bodyPr>
           <a:lstStyle/>
           <a:p>
-            <a:pPr/>
             <a:r>
               <a:t>Microservice 2</a:t>
             </a:r>
@@ -4822,7 +4966,7 @@
           </a:ln>
           <a:extLst>
             <a:ext uri="{C572A759-6A51-4108-AA02-DFA0A04FC94B}">
-              <ma14:wrappingTextBoxFlag xmlns:ma14="http://schemas.microsoft.com/office/mac/drawingml/2011/main" val="1"/>
+              <ma14:wrappingTextBoxFlag xmlns:ma14="http://schemas.microsoft.com/office/mac/drawingml/2011/main" xmlns="" val="1"/>
             </a:ext>
           </a:extLst>
         </p:spPr>
@@ -4832,7 +4976,6 @@
           </a:bodyPr>
           <a:lstStyle/>
           <a:p>
-            <a:pPr/>
             <a:r>
               <a:t>Microservice 3</a:t>
             </a:r>
@@ -4877,6 +5020,7 @@
                 <a:sym typeface="Helvetica"/>
               </a:defRPr>
             </a:pPr>
+            <a:endParaRPr/>
           </a:p>
         </p:txBody>
       </p:sp>
@@ -4918,6 +5062,7 @@
                 <a:sym typeface="Helvetica"/>
               </a:defRPr>
             </a:pPr>
+            <a:endParaRPr/>
           </a:p>
         </p:txBody>
       </p:sp>
@@ -4959,6 +5104,7 @@
                 <a:sym typeface="Helvetica"/>
               </a:defRPr>
             </a:pPr>
+            <a:endParaRPr/>
           </a:p>
         </p:txBody>
       </p:sp>
@@ -4970,8 +5116,8 @@
         </p:nvSpPr>
         <p:spPr>
           <a:xfrm>
-            <a:off x="1988822" y="12276287"/>
-            <a:ext cx="21316951" cy="876301"/>
+            <a:off x="1530472" y="12293809"/>
+            <a:ext cx="22233652" cy="841256"/>
           </a:xfrm>
           <a:prstGeom prst="rect">
             <a:avLst/>
@@ -4981,7 +5127,7 @@
           </a:ln>
           <a:extLst>
             <a:ext uri="{C572A759-6A51-4108-AA02-DFA0A04FC94B}">
-              <ma14:wrappingTextBoxFlag xmlns:ma14="http://schemas.microsoft.com/office/mac/drawingml/2011/main" val="1"/>
+              <ma14:wrappingTextBoxFlag xmlns:ma14="http://schemas.microsoft.com/office/mac/drawingml/2011/main" xmlns="" val="1"/>
             </a:ext>
           </a:extLst>
         </p:spPr>
@@ -4995,9 +5141,17 @@
             </a:lvl1pPr>
           </a:lstStyle>
           <a:p>
-            <a:pPr/>
-            <a:r>
-              <a:t>Each microservice can have different components, implementations and versions</a:t>
+            <a:r>
+              <a:rPr sz="4800" dirty="0"/>
+              <a:t>Each </a:t>
+            </a:r>
+            <a:r>
+              <a:rPr sz="4800" dirty="0" err="1"/>
+              <a:t>microservice</a:t>
+            </a:r>
+            <a:r>
+              <a:rPr sz="4800" dirty="0"/>
+              <a:t> can have different components, implementations and versions</a:t>
             </a:r>
           </a:p>
         </p:txBody>
@@ -5040,6 +5194,7 @@
                 <a:sym typeface="Helvetica"/>
               </a:defRPr>
             </a:pPr>
+            <a:endParaRPr/>
           </a:p>
         </p:txBody>
       </p:sp>
@@ -5065,7 +5220,7 @@
           </a:ln>
           <a:extLst>
             <a:ext uri="{C572A759-6A51-4108-AA02-DFA0A04FC94B}">
-              <ma14:wrappingTextBoxFlag xmlns:ma14="http://schemas.microsoft.com/office/mac/drawingml/2011/main" val="1"/>
+              <ma14:wrappingTextBoxFlag xmlns:ma14="http://schemas.microsoft.com/office/mac/drawingml/2011/main" xmlns="" val="1"/>
             </a:ext>
           </a:extLst>
         </p:spPr>
@@ -5081,7 +5236,6 @@
             </a:lvl1pPr>
           </a:lstStyle>
           <a:p>
-            <a:pPr/>
             <a:r>
               <a:t>Load balancer</a:t>
             </a:r>
@@ -5126,6 +5280,7 @@
                 <a:sym typeface="Helvetica"/>
               </a:defRPr>
             </a:pPr>
+            <a:endParaRPr/>
           </a:p>
         </p:txBody>
       </p:sp>
@@ -5167,6 +5322,7 @@
                 <a:sym typeface="Helvetica"/>
               </a:defRPr>
             </a:pPr>
+            <a:endParaRPr/>
           </a:p>
         </p:txBody>
       </p:sp>
@@ -5208,6 +5364,7 @@
                 <a:sym typeface="Helvetica"/>
               </a:defRPr>
             </a:pPr>
+            <a:endParaRPr/>
           </a:p>
         </p:txBody>
       </p:sp>
@@ -5216,12 +5373,12 @@
   <p:clrMapOvr>
     <a:masterClrMapping/>
   </p:clrMapOvr>
-  <p:transition xmlns:p14="http://schemas.microsoft.com/office/powerpoint/2010/main" spd="med" advClick="1" p14:dur="1000"/>
+  <p:transition spd="slow"/>
 </p:sld>
 </file>
 
 <file path=ppt/slides/slide6.xml><?xml version="1.0" encoding="utf-8"?>
-<p:sld xmlns:a="http://schemas.openxmlformats.org/drawingml/2006/main" xmlns:r="http://schemas.openxmlformats.org/officeDocument/2006/relationships" xmlns:p="http://schemas.openxmlformats.org/presentationml/2006/main" showMasterSp="1" showMasterPhAnim="1">
+<p:sld xmlns:a="http://schemas.openxmlformats.org/drawingml/2006/main" xmlns:r="http://schemas.openxmlformats.org/officeDocument/2006/relationships" xmlns:p="http://schemas.openxmlformats.org/presentationml/2006/main">
   <p:cSld>
     <p:spTree>
       <p:nvGrpSpPr>
@@ -5240,7 +5397,9 @@
       <p:sp>
         <p:nvSpPr>
           <p:cNvPr id="165" name="Shape 165"/>
-          <p:cNvSpPr/>
+          <p:cNvSpPr>
+            <a:spLocks noGrp="1"/>
+          </p:cNvSpPr>
           <p:nvPr>
             <p:ph type="title"/>
           </p:nvPr>
@@ -5254,7 +5413,6 @@
           <a:bodyPr/>
           <a:lstStyle/>
           <a:p>
-            <a:pPr/>
             <a:r>
               <a:t>Scaling and docker</a:t>
             </a:r>
@@ -5264,7 +5422,9 @@
       <p:sp>
         <p:nvSpPr>
           <p:cNvPr id="166" name="Shape 166"/>
-          <p:cNvSpPr/>
+          <p:cNvSpPr>
+            <a:spLocks noGrp="1"/>
+          </p:cNvSpPr>
           <p:nvPr>
             <p:ph type="body" idx="1"/>
           </p:nvPr>
@@ -5278,19 +5438,16 @@
           <a:bodyPr/>
           <a:lstStyle/>
           <a:p>
-            <a:pPr/>
             <a:r>
               <a:t>Works nicely with docker as it only requires Java SE</a:t>
             </a:r>
           </a:p>
           <a:p>
-            <a:pPr/>
             <a:r>
               <a:t>Microservices act like normal applications/processes</a:t>
             </a:r>
           </a:p>
           <a:p>
-            <a:pPr/>
             <a:r>
               <a:t>Simply run the produced JAR or build the microservice in the container and run it directly</a:t>
             </a:r>
@@ -5302,12 +5459,12 @@
   <p:clrMapOvr>
     <a:masterClrMapping/>
   </p:clrMapOvr>
-  <p:transition xmlns:p14="http://schemas.microsoft.com/office/powerpoint/2010/main" spd="med" advClick="1" p14:dur="1000"/>
+  <p:transition spd="slow"/>
 </p:sld>
 </file>
 
 <file path=ppt/slides/slide7.xml><?xml version="1.0" encoding="utf-8"?>
-<p:sld xmlns:a="http://schemas.openxmlformats.org/drawingml/2006/main" xmlns:r="http://schemas.openxmlformats.org/officeDocument/2006/relationships" xmlns:p="http://schemas.openxmlformats.org/presentationml/2006/main" showMasterSp="1" showMasterPhAnim="1">
+<p:sld xmlns:a="http://schemas.openxmlformats.org/drawingml/2006/main" xmlns:r="http://schemas.openxmlformats.org/officeDocument/2006/relationships" xmlns:p="http://schemas.openxmlformats.org/presentationml/2006/main">
   <p:cSld>
     <p:spTree>
       <p:nvGrpSpPr>
@@ -5342,7 +5499,7 @@
           </a:ln>
           <a:extLst>
             <a:ext uri="{C572A759-6A51-4108-AA02-DFA0A04FC94B}">
-              <ma14:wrappingTextBoxFlag xmlns:ma14="http://schemas.microsoft.com/office/mac/drawingml/2011/main" val="1"/>
+              <ma14:wrappingTextBoxFlag xmlns:ma14="http://schemas.microsoft.com/office/mac/drawingml/2011/main" xmlns="" val="1"/>
             </a:ext>
           </a:extLst>
         </p:spPr>
@@ -5625,11 +5782,6 @@
               </a:rPr>
               <a:t>&gt;</a:t>
             </a:r>
-            <a:endParaRPr>
-              <a:solidFill>
-                <a:srgbClr val="7A7A7A"/>
-              </a:solidFill>
-            </a:endParaRPr>
           </a:p>
           <a:p>
             <a:pPr algn="l" defTabSz="457200">
@@ -5923,11 +6075,6 @@
               </a:rPr>
               <a:t>&gt;</a:t>
             </a:r>
-            <a:endParaRPr>
-              <a:solidFill>
-                <a:srgbClr val="7A7A7A"/>
-              </a:solidFill>
-            </a:endParaRPr>
           </a:p>
           <a:p>
             <a:pPr algn="l" defTabSz="457200">
@@ -6243,7 +6390,7 @@
           </a:ln>
           <a:extLst>
             <a:ext uri="{C572A759-6A51-4108-AA02-DFA0A04FC94B}">
-              <ma14:wrappingTextBoxFlag xmlns:ma14="http://schemas.microsoft.com/office/mac/drawingml/2011/main" val="1"/>
+              <ma14:wrappingTextBoxFlag xmlns:ma14="http://schemas.microsoft.com/office/mac/drawingml/2011/main" xmlns="" val="1"/>
             </a:ext>
           </a:extLst>
         </p:spPr>
@@ -6253,13 +6400,11 @@
           </a:bodyPr>
           <a:lstStyle/>
           <a:p>
-            <a:pPr/>
             <a:r>
               <a:t>Add the required dependencies</a:t>
             </a:r>
           </a:p>
           <a:p>
-            <a:pPr/>
             <a:r>
               <a:t>(only add what you need)</a:t>
             </a:r>
@@ -6285,7 +6430,7 @@
           </a:ln>
           <a:extLst>
             <a:ext uri="{C572A759-6A51-4108-AA02-DFA0A04FC94B}">
-              <ma14:wrappingTextBoxFlag xmlns:ma14="http://schemas.microsoft.com/office/mac/drawingml/2011/main" val="1"/>
+              <ma14:wrappingTextBoxFlag xmlns:ma14="http://schemas.microsoft.com/office/mac/drawingml/2011/main" xmlns="" val="1"/>
             </a:ext>
           </a:extLst>
         </p:spPr>
@@ -6325,11 +6470,6 @@
               </a:rPr>
               <a:t>)</a:t>
             </a:r>
-            <a:endParaRPr>
-              <a:solidFill>
-                <a:srgbClr val="3B3B3B"/>
-              </a:solidFill>
-            </a:endParaRPr>
           </a:p>
           <a:p>
             <a:pPr algn="l" defTabSz="457200">
@@ -6399,6 +6539,11 @@
                 <a:sym typeface="Monaco"/>
               </a:defRPr>
             </a:pPr>
+            <a:endParaRPr>
+              <a:solidFill>
+                <a:srgbClr val="3B3B3B"/>
+              </a:solidFill>
+            </a:endParaRPr>
           </a:p>
           <a:p>
             <a:pPr algn="l" defTabSz="457200">
@@ -6482,11 +6627,6 @@
               </a:rPr>
               <a:t>})</a:t>
             </a:r>
-            <a:endParaRPr>
-              <a:solidFill>
-                <a:srgbClr val="3B3B3B"/>
-              </a:solidFill>
-            </a:endParaRPr>
           </a:p>
           <a:p>
             <a:pPr algn="l" defTabSz="457200">
@@ -6546,11 +6686,6 @@
               </a:rPr>
               <a:t>() {</a:t>
             </a:r>
-            <a:endParaRPr>
-              <a:solidFill>
-                <a:srgbClr val="3B3B3B"/>
-              </a:solidFill>
-            </a:endParaRPr>
           </a:p>
           <a:p>
             <a:pPr algn="l" defTabSz="457200">
@@ -6640,7 +6775,7 @@
           </a:ln>
           <a:extLst>
             <a:ext uri="{C572A759-6A51-4108-AA02-DFA0A04FC94B}">
-              <ma14:wrappingTextBoxFlag xmlns:ma14="http://schemas.microsoft.com/office/mac/drawingml/2011/main" val="1"/>
+              <ma14:wrappingTextBoxFlag xmlns:ma14="http://schemas.microsoft.com/office/mac/drawingml/2011/main" xmlns="" val="1"/>
             </a:ext>
           </a:extLst>
         </p:spPr>
@@ -6650,7 +6785,6 @@
           </a:bodyPr>
           <a:lstStyle/>
           <a:p>
-            <a:pPr/>
             <a:r>
               <a:t>Add standard Java EE components</a:t>
             </a:r>
@@ -6676,7 +6810,7 @@
           </a:ln>
           <a:extLst>
             <a:ext uri="{C572A759-6A51-4108-AA02-DFA0A04FC94B}">
-              <ma14:wrappingTextBoxFlag xmlns:ma14="http://schemas.microsoft.com/office/mac/drawingml/2011/main" val="1"/>
+              <ma14:wrappingTextBoxFlag xmlns:ma14="http://schemas.microsoft.com/office/mac/drawingml/2011/main" xmlns="" val="1"/>
             </a:ext>
           </a:extLst>
         </p:spPr>
@@ -6783,11 +6917,6 @@
               </a:rPr>
               <a:t> Application {</a:t>
             </a:r>
-            <a:endParaRPr>
-              <a:solidFill>
-                <a:srgbClr val="3B3B3B"/>
-              </a:solidFill>
-            </a:endParaRPr>
           </a:p>
           <a:p>
             <a:pPr algn="l" defTabSz="457200">
@@ -6812,12 +6941,12 @@
   <p:clrMapOvr>
     <a:masterClrMapping/>
   </p:clrMapOvr>
-  <p:transition xmlns:p14="http://schemas.microsoft.com/office/powerpoint/2010/main" spd="med" advClick="1" p14:dur="1000"/>
+  <p:transition spd="slow"/>
 </p:sld>
 </file>
 
 <file path=ppt/slides/slide8.xml><?xml version="1.0" encoding="utf-8"?>
-<p:sld xmlns:a="http://schemas.openxmlformats.org/drawingml/2006/main" xmlns:r="http://schemas.openxmlformats.org/officeDocument/2006/relationships" xmlns:p="http://schemas.openxmlformats.org/presentationml/2006/main" showMasterSp="1" showMasterPhAnim="1">
+<p:sld xmlns:a="http://schemas.openxmlformats.org/drawingml/2006/main" xmlns:r="http://schemas.openxmlformats.org/officeDocument/2006/relationships" xmlns:p="http://schemas.openxmlformats.org/presentationml/2006/main">
   <p:cSld>
     <p:spTree>
       <p:nvGrpSpPr>
@@ -6852,7 +6981,7 @@
           </a:ln>
           <a:extLst>
             <a:ext uri="{C572A759-6A51-4108-AA02-DFA0A04FC94B}">
-              <ma14:wrappingTextBoxFlag xmlns:ma14="http://schemas.microsoft.com/office/mac/drawingml/2011/main" val="1"/>
+              <ma14:wrappingTextBoxFlag xmlns:ma14="http://schemas.microsoft.com/office/mac/drawingml/2011/main" xmlns="" val="1"/>
             </a:ext>
           </a:extLst>
         </p:spPr>
@@ -6862,7 +6991,6 @@
           </a:bodyPr>
           <a:lstStyle/>
           <a:p>
-            <a:pPr/>
             <a:r>
               <a:t>Build it</a:t>
             </a:r>
@@ -6877,8 +7005,8 @@
         </p:nvSpPr>
         <p:spPr>
           <a:xfrm>
-            <a:off x="9528385" y="1968512"/>
-            <a:ext cx="5327230" cy="673101"/>
+            <a:off x="9902249" y="1968437"/>
+            <a:ext cx="4579501" cy="673101"/>
           </a:xfrm>
           <a:prstGeom prst="rect">
             <a:avLst/>
@@ -6888,12 +7016,12 @@
           </a:ln>
           <a:extLst>
             <a:ext uri="{C572A759-6A51-4108-AA02-DFA0A04FC94B}">
-              <ma14:wrappingTextBoxFlag xmlns:ma14="http://schemas.microsoft.com/office/mac/drawingml/2011/main" val="1"/>
+              <ma14:wrappingTextBoxFlag xmlns:ma14="http://schemas.microsoft.com/office/mac/drawingml/2011/main" xmlns="" val="1"/>
             </a:ext>
           </a:extLst>
         </p:spPr>
         <p:txBody>
-          <a:bodyPr wrap="none" lIns="50800" tIns="50800" rIns="50800" bIns="50800" anchor="ctr">
+          <a:bodyPr wrap="square" lIns="50800" tIns="50800" rIns="50800" bIns="50800" anchor="ctr">
             <a:spAutoFit/>
           </a:bodyPr>
           <a:lstStyle>
@@ -6910,10 +7038,23 @@
             </a:lvl1pPr>
           </a:lstStyle>
           <a:p>
-            <a:pPr/>
-            <a:r>
-              <a:t>$ mvn clean package</a:t>
-            </a:r>
+            <a:r>
+              <a:rPr dirty="0"/>
+              <a:t>$ </a:t>
+            </a:r>
+            <a:r>
+              <a:rPr dirty="0" err="1"/>
+              <a:t>mvn</a:t>
+            </a:r>
+            <a:r>
+              <a:rPr dirty="0"/>
+              <a:t> clean </a:t>
+            </a:r>
+            <a:r>
+              <a:rPr dirty="0" smtClean="0"/>
+              <a:t>package</a:t>
+            </a:r>
+            <a:endParaRPr dirty="0"/>
           </a:p>
         </p:txBody>
       </p:sp>
@@ -6936,7 +7077,7 @@
           </a:ln>
           <a:extLst>
             <a:ext uri="{C572A759-6A51-4108-AA02-DFA0A04FC94B}">
-              <ma14:wrappingTextBoxFlag xmlns:ma14="http://schemas.microsoft.com/office/mac/drawingml/2011/main" val="1"/>
+              <ma14:wrappingTextBoxFlag xmlns:ma14="http://schemas.microsoft.com/office/mac/drawingml/2011/main" xmlns="" val="1"/>
             </a:ext>
           </a:extLst>
         </p:spPr>
@@ -6946,7 +7087,6 @@
           </a:bodyPr>
           <a:lstStyle/>
           <a:p>
-            <a:pPr/>
             <a:r>
               <a:t>And run it dirrectly</a:t>
             </a:r>
@@ -6961,8 +7101,8 @@
         </p:nvSpPr>
         <p:spPr>
           <a:xfrm>
-            <a:off x="1983358" y="5510771"/>
-            <a:ext cx="20417285" cy="673101"/>
+            <a:off x="4322707" y="5510771"/>
+            <a:ext cx="15738586" cy="673101"/>
           </a:xfrm>
           <a:prstGeom prst="rect">
             <a:avLst/>
@@ -6972,12 +7112,12 @@
           </a:ln>
           <a:extLst>
             <a:ext uri="{C572A759-6A51-4108-AA02-DFA0A04FC94B}">
-              <ma14:wrappingTextBoxFlag xmlns:ma14="http://schemas.microsoft.com/office/mac/drawingml/2011/main" val="1"/>
+              <ma14:wrappingTextBoxFlag xmlns:ma14="http://schemas.microsoft.com/office/mac/drawingml/2011/main" xmlns="" val="1"/>
             </a:ext>
           </a:extLst>
         </p:spPr>
         <p:txBody>
-          <a:bodyPr wrap="none" lIns="50800" tIns="50800" rIns="50800" bIns="50800" anchor="ctr">
+          <a:bodyPr wrap="square" lIns="50800" tIns="50800" rIns="50800" bIns="50800" anchor="ctr">
             <a:spAutoFit/>
           </a:bodyPr>
           <a:lstStyle/>
@@ -6994,10 +7134,27 @@
               </a:defRPr>
             </a:pPr>
             <a:r>
-              <a:t>$ java -cp target/classes:target/dependency/</a:t>
-            </a:r>
-            <a:r>
-              <a:rPr>
+              <a:rPr dirty="0"/>
+              <a:t>$ java -</a:t>
+            </a:r>
+            <a:r>
+              <a:rPr dirty="0" err="1"/>
+              <a:t>cp</a:t>
+            </a:r>
+            <a:r>
+              <a:rPr dirty="0"/>
+              <a:t> target/</a:t>
+            </a:r>
+            <a:r>
+              <a:rPr dirty="0" err="1"/>
+              <a:t>classes:target</a:t>
+            </a:r>
+            <a:r>
+              <a:rPr dirty="0"/>
+              <a:t>/dependency/</a:t>
+            </a:r>
+            <a:r>
+              <a:rPr dirty="0">
                 <a:solidFill>
                   <a:srgbClr val="006699"/>
                 </a:solidFill>
@@ -7005,8 +7162,14 @@
               <a:t>*</a:t>
             </a:r>
             <a:r>
-              <a:t> com.kumuluz.ee.EeApplication</a:t>
-            </a:r>
+              <a:rPr dirty="0"/>
+              <a:t> </a:t>
+            </a:r>
+            <a:r>
+              <a:rPr dirty="0" err="1"/>
+              <a:t>com.kumuluz.ee.EeApplication</a:t>
+            </a:r>
+            <a:endParaRPr dirty="0"/>
           </a:p>
         </p:txBody>
       </p:sp>
@@ -7029,7 +7192,7 @@
           </a:ln>
           <a:extLst>
             <a:ext uri="{C572A759-6A51-4108-AA02-DFA0A04FC94B}">
-              <ma14:wrappingTextBoxFlag xmlns:ma14="http://schemas.microsoft.com/office/mac/drawingml/2011/main" val="1"/>
+              <ma14:wrappingTextBoxFlag xmlns:ma14="http://schemas.microsoft.com/office/mac/drawingml/2011/main" xmlns="" val="1"/>
             </a:ext>
           </a:extLst>
         </p:spPr>
@@ -7039,7 +7202,6 @@
           </a:bodyPr>
           <a:lstStyle/>
           <a:p>
-            <a:pPr/>
             <a:r>
               <a:t>Or run from the produced JAR</a:t>
             </a:r>
@@ -7054,8 +7216,8 @@
         </p:nvSpPr>
         <p:spPr>
           <a:xfrm>
-            <a:off x="4589822" y="9053031"/>
-            <a:ext cx="15204356" cy="673101"/>
+            <a:off x="6072254" y="9052957"/>
+            <a:ext cx="12239492" cy="673101"/>
           </a:xfrm>
           <a:prstGeom prst="rect">
             <a:avLst/>
@@ -7065,12 +7227,12 @@
           </a:ln>
           <a:extLst>
             <a:ext uri="{C572A759-6A51-4108-AA02-DFA0A04FC94B}">
-              <ma14:wrappingTextBoxFlag xmlns:ma14="http://schemas.microsoft.com/office/mac/drawingml/2011/main" val="1"/>
+              <ma14:wrappingTextBoxFlag xmlns:ma14="http://schemas.microsoft.com/office/mac/drawingml/2011/main" xmlns="" val="1"/>
             </a:ext>
           </a:extLst>
         </p:spPr>
         <p:txBody>
-          <a:bodyPr wrap="none" lIns="50800" tIns="50800" rIns="50800" bIns="50800" anchor="ctr">
+          <a:bodyPr wrap="square" lIns="50800" tIns="50800" rIns="50800" bIns="50800" anchor="ctr">
             <a:spAutoFit/>
           </a:bodyPr>
           <a:lstStyle>
@@ -7087,8 +7249,8 @@
             </a:lvl1pPr>
           </a:lstStyle>
           <a:p>
-            <a:pPr/>
-            <a:r>
+            <a:r>
+              <a:rPr dirty="0"/>
               <a:t>$ java -jar target/kumuluzee-example-1.0.0-SNAPSHOT.jar</a:t>
             </a:r>
           </a:p>
@@ -7099,12 +7261,12 @@
   <p:clrMapOvr>
     <a:masterClrMapping/>
   </p:clrMapOvr>
-  <p:transition xmlns:p14="http://schemas.microsoft.com/office/powerpoint/2010/main" spd="med" advClick="1" p14:dur="1000"/>
+  <p:transition spd="slow"/>
 </p:sld>
 </file>
 
 <file path=ppt/slides/slide9.xml><?xml version="1.0" encoding="utf-8"?>
-<p:sld xmlns:a="http://schemas.openxmlformats.org/drawingml/2006/main" xmlns:r="http://schemas.openxmlformats.org/officeDocument/2006/relationships" xmlns:p="http://schemas.openxmlformats.org/presentationml/2006/main" showMasterSp="1" showMasterPhAnim="1">
+<p:sld xmlns:a="http://schemas.openxmlformats.org/drawingml/2006/main" xmlns:r="http://schemas.openxmlformats.org/officeDocument/2006/relationships" xmlns:p="http://schemas.openxmlformats.org/presentationml/2006/main">
   <p:cSld>
     <p:spTree>
       <p:nvGrpSpPr>
@@ -7123,7 +7285,9 @@
       <p:sp>
         <p:nvSpPr>
           <p:cNvPr id="183" name="Shape 183"/>
-          <p:cNvSpPr/>
+          <p:cNvSpPr>
+            <a:spLocks noGrp="1"/>
+          </p:cNvSpPr>
           <p:nvPr>
             <p:ph type="body" idx="1"/>
           </p:nvPr>
@@ -7137,25 +7301,21 @@
           <a:bodyPr/>
           <a:lstStyle/>
           <a:p>
-            <a:pPr/>
             <a:r>
               <a:t>Scaling is as simple as multiplying the instances and load balancing</a:t>
             </a:r>
           </a:p>
           <a:p>
-            <a:pPr/>
             <a:r>
               <a:t>Can scale using PaaS, and all Docker-like environments (Kubernetes, CoreOS, …) or whichever way you like</a:t>
             </a:r>
           </a:p>
           <a:p>
-            <a:pPr/>
             <a:r>
               <a:t>Settings are controlled via environment variables</a:t>
             </a:r>
           </a:p>
           <a:p>
-            <a:pPr/>
             <a:r>
               <a:t>Each microservice can be scaled completely separately according to its needs</a:t>
             </a:r>
@@ -7167,12 +7327,12 @@
   <p:clrMapOvr>
     <a:masterClrMapping/>
   </p:clrMapOvr>
-  <p:transition xmlns:p14="http://schemas.microsoft.com/office/powerpoint/2010/main" spd="med" advClick="1" p14:dur="1000"/>
+  <p:transition spd="slow"/>
 </p:sld>
 </file>
 
 <file path=ppt/theme/theme1.xml><?xml version="1.0" encoding="utf-8"?>
-<a:theme xmlns:a="http://schemas.openxmlformats.org/drawingml/2006/main" xmlns:r="http://schemas.openxmlformats.org/officeDocument/2006/relationships" name="Showroom">
+<a:theme xmlns:a="http://schemas.openxmlformats.org/drawingml/2006/main" name="Showroom">
   <a:themeElements>
     <a:clrScheme name="Showroom">
       <a:dk1>
@@ -7371,7 +7531,7 @@
         <a:effectLst/>
         <a:sp3d/>
       </a:spPr>
-      <a:bodyPr rot="0" spcFirstLastPara="1" vertOverflow="overflow" horzOverflow="overflow" vert="horz" wrap="square" lIns="50800" tIns="50800" rIns="50800" bIns="50800" numCol="1" spcCol="38100" rtlCol="0" anchor="ctr" upright="0">
+      <a:bodyPr rot="0" spcFirstLastPara="1" vertOverflow="overflow" horzOverflow="overflow" vert="horz" wrap="square" lIns="50800" tIns="50800" rIns="50800" bIns="50800" numCol="1" spcCol="38100" rtlCol="0" anchor="ctr">
         <a:spAutoFit/>
       </a:bodyPr>
       <a:lstStyle>
@@ -7390,7 +7550,7 @@
           <a:buFontTx/>
           <a:buNone/>
           <a:tabLst/>
-          <a:defRPr b="0" baseline="0" cap="none" i="0" spc="0" strike="noStrike" sz="5000" u="none" kumimoji="0" normalizeH="0">
+          <a:defRPr kumimoji="0" sz="5000" b="0" i="0" u="none" strike="noStrike" cap="none" spc="0" normalizeH="0" baseline="0">
             <a:ln>
               <a:noFill/>
             </a:ln>
@@ -7420,7 +7580,7 @@
           <a:buFontTx/>
           <a:buNone/>
           <a:tabLst/>
-          <a:defRPr b="0" baseline="0" cap="none" i="0" spc="0" strike="noStrike" sz="1800" u="none" kumimoji="0" normalizeH="0">
+          <a:defRPr kumimoji="0" sz="1800" b="0" i="0" u="none" strike="noStrike" cap="none" spc="0" normalizeH="0" baseline="0">
             <a:ln>
               <a:noFill/>
             </a:ln>
@@ -7446,7 +7606,7 @@
           <a:buFontTx/>
           <a:buNone/>
           <a:tabLst/>
-          <a:defRPr b="0" baseline="0" cap="none" i="0" spc="0" strike="noStrike" sz="1800" u="none" kumimoji="0" normalizeH="0">
+          <a:defRPr kumimoji="0" sz="1800" b="0" i="0" u="none" strike="noStrike" cap="none" spc="0" normalizeH="0" baseline="0">
             <a:ln>
               <a:noFill/>
             </a:ln>
@@ -7472,7 +7632,7 @@
           <a:buFontTx/>
           <a:buNone/>
           <a:tabLst/>
-          <a:defRPr b="0" baseline="0" cap="none" i="0" spc="0" strike="noStrike" sz="1800" u="none" kumimoji="0" normalizeH="0">
+          <a:defRPr kumimoji="0" sz="1800" b="0" i="0" u="none" strike="noStrike" cap="none" spc="0" normalizeH="0" baseline="0">
             <a:ln>
               <a:noFill/>
             </a:ln>
@@ -7498,7 +7658,7 @@
           <a:buFontTx/>
           <a:buNone/>
           <a:tabLst/>
-          <a:defRPr b="0" baseline="0" cap="none" i="0" spc="0" strike="noStrike" sz="1800" u="none" kumimoji="0" normalizeH="0">
+          <a:defRPr kumimoji="0" sz="1800" b="0" i="0" u="none" strike="noStrike" cap="none" spc="0" normalizeH="0" baseline="0">
             <a:ln>
               <a:noFill/>
             </a:ln>
@@ -7524,7 +7684,7 @@
           <a:buFontTx/>
           <a:buNone/>
           <a:tabLst/>
-          <a:defRPr b="0" baseline="0" cap="none" i="0" spc="0" strike="noStrike" sz="1800" u="none" kumimoji="0" normalizeH="0">
+          <a:defRPr kumimoji="0" sz="1800" b="0" i="0" u="none" strike="noStrike" cap="none" spc="0" normalizeH="0" baseline="0">
             <a:ln>
               <a:noFill/>
             </a:ln>
@@ -7550,7 +7710,7 @@
           <a:buFontTx/>
           <a:buNone/>
           <a:tabLst/>
-          <a:defRPr b="0" baseline="0" cap="none" i="0" spc="0" strike="noStrike" sz="1800" u="none" kumimoji="0" normalizeH="0">
+          <a:defRPr kumimoji="0" sz="1800" b="0" i="0" u="none" strike="noStrike" cap="none" spc="0" normalizeH="0" baseline="0">
             <a:ln>
               <a:noFill/>
             </a:ln>
@@ -7576,7 +7736,7 @@
           <a:buFontTx/>
           <a:buNone/>
           <a:tabLst/>
-          <a:defRPr b="0" baseline="0" cap="none" i="0" spc="0" strike="noStrike" sz="1800" u="none" kumimoji="0" normalizeH="0">
+          <a:defRPr kumimoji="0" sz="1800" b="0" i="0" u="none" strike="noStrike" cap="none" spc="0" normalizeH="0" baseline="0">
             <a:ln>
               <a:noFill/>
             </a:ln>
@@ -7602,7 +7762,7 @@
           <a:buFontTx/>
           <a:buNone/>
           <a:tabLst/>
-          <a:defRPr b="0" baseline="0" cap="none" i="0" spc="0" strike="noStrike" sz="1800" u="none" kumimoji="0" normalizeH="0">
+          <a:defRPr kumimoji="0" sz="1800" b="0" i="0" u="none" strike="noStrike" cap="none" spc="0" normalizeH="0" baseline="0">
             <a:ln>
               <a:noFill/>
             </a:ln>
@@ -7628,7 +7788,7 @@
           <a:buFontTx/>
           <a:buNone/>
           <a:tabLst/>
-          <a:defRPr b="0" baseline="0" cap="none" i="0" spc="0" strike="noStrike" sz="1800" u="none" kumimoji="0" normalizeH="0">
+          <a:defRPr kumimoji="0" sz="1800" b="0" i="0" u="none" strike="noStrike" cap="none" spc="0" normalizeH="0" baseline="0">
             <a:ln>
               <a:noFill/>
             </a:ln>
@@ -7641,9 +7801,15 @@
         </a:lvl9pPr>
       </a:lstStyle>
       <a:style>
-        <a:lnRef idx="0"/>
-        <a:fillRef idx="0"/>
-        <a:effectRef idx="0"/>
+        <a:lnRef idx="0">
+          <a:scrgbClr r="0" g="0" b="0"/>
+        </a:lnRef>
+        <a:fillRef idx="0">
+          <a:scrgbClr r="0" g="0" b="0"/>
+        </a:fillRef>
+        <a:effectRef idx="0">
+          <a:scrgbClr r="0" g="0" b="0"/>
+        </a:effectRef>
         <a:fontRef idx="none"/>
       </a:style>
     </a:spDef>
@@ -7660,7 +7826,7 @@
         <a:effectLst/>
         <a:sp3d/>
       </a:spPr>
-      <a:bodyPr rot="0" spcFirstLastPara="1" vertOverflow="overflow" horzOverflow="overflow" vert="horz" wrap="square" lIns="91439" tIns="45719" rIns="91439" bIns="45719" numCol="1" spcCol="38100" rtlCol="0" anchor="t" upright="0">
+      <a:bodyPr rot="0" spcFirstLastPara="1" vertOverflow="overflow" horzOverflow="overflow" vert="horz" wrap="square" lIns="91439" tIns="45719" rIns="91439" bIns="45719" numCol="1" spcCol="38100" rtlCol="0" anchor="t">
         <a:noAutofit/>
       </a:bodyPr>
       <a:lstStyle>
@@ -7679,7 +7845,7 @@
           <a:buFontTx/>
           <a:buNone/>
           <a:tabLst/>
-          <a:defRPr b="0" baseline="0" cap="none" i="0" spc="0" strike="noStrike" sz="1800" u="none" kumimoji="0" normalizeH="0">
+          <a:defRPr kumimoji="0" sz="1800" b="0" i="0" u="none" strike="noStrike" cap="none" spc="0" normalizeH="0" baseline="0">
             <a:ln>
               <a:noFill/>
             </a:ln>
@@ -7705,7 +7871,7 @@
           <a:buFontTx/>
           <a:buNone/>
           <a:tabLst/>
-          <a:defRPr b="0" baseline="0" cap="none" i="0" spc="0" strike="noStrike" sz="1800" u="none" kumimoji="0" normalizeH="0">
+          <a:defRPr kumimoji="0" sz="1800" b="0" i="0" u="none" strike="noStrike" cap="none" spc="0" normalizeH="0" baseline="0">
             <a:ln>
               <a:noFill/>
             </a:ln>
@@ -7731,7 +7897,7 @@
           <a:buFontTx/>
           <a:buNone/>
           <a:tabLst/>
-          <a:defRPr b="0" baseline="0" cap="none" i="0" spc="0" strike="noStrike" sz="1800" u="none" kumimoji="0" normalizeH="0">
+          <a:defRPr kumimoji="0" sz="1800" b="0" i="0" u="none" strike="noStrike" cap="none" spc="0" normalizeH="0" baseline="0">
             <a:ln>
               <a:noFill/>
             </a:ln>
@@ -7757,7 +7923,7 @@
           <a:buFontTx/>
           <a:buNone/>
           <a:tabLst/>
-          <a:defRPr b="0" baseline="0" cap="none" i="0" spc="0" strike="noStrike" sz="1800" u="none" kumimoji="0" normalizeH="0">
+          <a:defRPr kumimoji="0" sz="1800" b="0" i="0" u="none" strike="noStrike" cap="none" spc="0" normalizeH="0" baseline="0">
             <a:ln>
               <a:noFill/>
             </a:ln>
@@ -7783,7 +7949,7 @@
           <a:buFontTx/>
           <a:buNone/>
           <a:tabLst/>
-          <a:defRPr b="0" baseline="0" cap="none" i="0" spc="0" strike="noStrike" sz="1800" u="none" kumimoji="0" normalizeH="0">
+          <a:defRPr kumimoji="0" sz="1800" b="0" i="0" u="none" strike="noStrike" cap="none" spc="0" normalizeH="0" baseline="0">
             <a:ln>
               <a:noFill/>
             </a:ln>
@@ -7809,7 +7975,7 @@
           <a:buFontTx/>
           <a:buNone/>
           <a:tabLst/>
-          <a:defRPr b="0" baseline="0" cap="none" i="0" spc="0" strike="noStrike" sz="1800" u="none" kumimoji="0" normalizeH="0">
+          <a:defRPr kumimoji="0" sz="1800" b="0" i="0" u="none" strike="noStrike" cap="none" spc="0" normalizeH="0" baseline="0">
             <a:ln>
               <a:noFill/>
             </a:ln>
@@ -7835,7 +8001,7 @@
           <a:buFontTx/>
           <a:buNone/>
           <a:tabLst/>
-          <a:defRPr b="0" baseline="0" cap="none" i="0" spc="0" strike="noStrike" sz="1800" u="none" kumimoji="0" normalizeH="0">
+          <a:defRPr kumimoji="0" sz="1800" b="0" i="0" u="none" strike="noStrike" cap="none" spc="0" normalizeH="0" baseline="0">
             <a:ln>
               <a:noFill/>
             </a:ln>
@@ -7861,7 +8027,7 @@
           <a:buFontTx/>
           <a:buNone/>
           <a:tabLst/>
-          <a:defRPr b="0" baseline="0" cap="none" i="0" spc="0" strike="noStrike" sz="1800" u="none" kumimoji="0" normalizeH="0">
+          <a:defRPr kumimoji="0" sz="1800" b="0" i="0" u="none" strike="noStrike" cap="none" spc="0" normalizeH="0" baseline="0">
             <a:ln>
               <a:noFill/>
             </a:ln>
@@ -7887,7 +8053,7 @@
           <a:buFontTx/>
           <a:buNone/>
           <a:tabLst/>
-          <a:defRPr b="0" baseline="0" cap="none" i="0" spc="0" strike="noStrike" sz="1800" u="none" kumimoji="0" normalizeH="0">
+          <a:defRPr kumimoji="0" sz="1800" b="0" i="0" u="none" strike="noStrike" cap="none" spc="0" normalizeH="0" baseline="0">
             <a:ln>
               <a:noFill/>
             </a:ln>
@@ -7913,7 +8079,7 @@
           <a:buFontTx/>
           <a:buNone/>
           <a:tabLst/>
-          <a:defRPr b="0" baseline="0" cap="none" i="0" spc="0" strike="noStrike" sz="1800" u="none" kumimoji="0" normalizeH="0">
+          <a:defRPr kumimoji="0" sz="1800" b="0" i="0" u="none" strike="noStrike" cap="none" spc="0" normalizeH="0" baseline="0">
             <a:ln>
               <a:noFill/>
             </a:ln>
@@ -7926,9 +8092,15 @@
         </a:lvl9pPr>
       </a:lstStyle>
       <a:style>
-        <a:lnRef idx="0"/>
-        <a:fillRef idx="0"/>
-        <a:effectRef idx="0"/>
+        <a:lnRef idx="0">
+          <a:scrgbClr r="0" g="0" b="0"/>
+        </a:lnRef>
+        <a:fillRef idx="0">
+          <a:scrgbClr r="0" g="0" b="0"/>
+        </a:fillRef>
+        <a:effectRef idx="0">
+          <a:scrgbClr r="0" g="0" b="0"/>
+        </a:effectRef>
         <a:fontRef idx="none"/>
       </a:style>
     </a:lnDef>
@@ -7942,7 +8114,7 @@
         <a:effectLst/>
         <a:sp3d/>
       </a:spPr>
-      <a:bodyPr rot="0" spcFirstLastPara="1" vertOverflow="overflow" horzOverflow="overflow" vert="horz" wrap="square" lIns="50800" tIns="50800" rIns="50800" bIns="50800" numCol="1" spcCol="38100" rtlCol="0" anchor="ctr" upright="0">
+      <a:bodyPr rot="0" spcFirstLastPara="1" vertOverflow="overflow" horzOverflow="overflow" vert="horz" wrap="square" lIns="50800" tIns="50800" rIns="50800" bIns="50800" numCol="1" spcCol="38100" rtlCol="0" anchor="ctr">
         <a:spAutoFit/>
       </a:bodyPr>
       <a:lstStyle>
@@ -7961,7 +8133,7 @@
           <a:buFontTx/>
           <a:buNone/>
           <a:tabLst/>
-          <a:defRPr b="0" baseline="0" cap="none" i="0" spc="0" strike="noStrike" sz="5000" u="none" kumimoji="0" normalizeH="0">
+          <a:defRPr kumimoji="0" sz="5000" b="0" i="0" u="none" strike="noStrike" cap="none" spc="0" normalizeH="0" baseline="0">
             <a:ln>
               <a:noFill/>
             </a:ln>
@@ -7991,7 +8163,7 @@
           <a:buFontTx/>
           <a:buNone/>
           <a:tabLst/>
-          <a:defRPr b="0" baseline="0" cap="none" i="0" spc="0" strike="noStrike" sz="1800" u="none" kumimoji="0" normalizeH="0">
+          <a:defRPr kumimoji="0" sz="1800" b="0" i="0" u="none" strike="noStrike" cap="none" spc="0" normalizeH="0" baseline="0">
             <a:ln>
               <a:noFill/>
             </a:ln>
@@ -8017,7 +8189,7 @@
           <a:buFontTx/>
           <a:buNone/>
           <a:tabLst/>
-          <a:defRPr b="0" baseline="0" cap="none" i="0" spc="0" strike="noStrike" sz="1800" u="none" kumimoji="0" normalizeH="0">
+          <a:defRPr kumimoji="0" sz="1800" b="0" i="0" u="none" strike="noStrike" cap="none" spc="0" normalizeH="0" baseline="0">
             <a:ln>
               <a:noFill/>
             </a:ln>
@@ -8043,7 +8215,7 @@
           <a:buFontTx/>
           <a:buNone/>
           <a:tabLst/>
-          <a:defRPr b="0" baseline="0" cap="none" i="0" spc="0" strike="noStrike" sz="1800" u="none" kumimoji="0" normalizeH="0">
+          <a:defRPr kumimoji="0" sz="1800" b="0" i="0" u="none" strike="noStrike" cap="none" spc="0" normalizeH="0" baseline="0">
             <a:ln>
               <a:noFill/>
             </a:ln>
@@ -8069,7 +8241,7 @@
           <a:buFontTx/>
           <a:buNone/>
           <a:tabLst/>
-          <a:defRPr b="0" baseline="0" cap="none" i="0" spc="0" strike="noStrike" sz="1800" u="none" kumimoji="0" normalizeH="0">
+          <a:defRPr kumimoji="0" sz="1800" b="0" i="0" u="none" strike="noStrike" cap="none" spc="0" normalizeH="0" baseline="0">
             <a:ln>
               <a:noFill/>
             </a:ln>
@@ -8095,7 +8267,7 @@
           <a:buFontTx/>
           <a:buNone/>
           <a:tabLst/>
-          <a:defRPr b="0" baseline="0" cap="none" i="0" spc="0" strike="noStrike" sz="1800" u="none" kumimoji="0" normalizeH="0">
+          <a:defRPr kumimoji="0" sz="1800" b="0" i="0" u="none" strike="noStrike" cap="none" spc="0" normalizeH="0" baseline="0">
             <a:ln>
               <a:noFill/>
             </a:ln>
@@ -8121,7 +8293,7 @@
           <a:buFontTx/>
           <a:buNone/>
           <a:tabLst/>
-          <a:defRPr b="0" baseline="0" cap="none" i="0" spc="0" strike="noStrike" sz="1800" u="none" kumimoji="0" normalizeH="0">
+          <a:defRPr kumimoji="0" sz="1800" b="0" i="0" u="none" strike="noStrike" cap="none" spc="0" normalizeH="0" baseline="0">
             <a:ln>
               <a:noFill/>
             </a:ln>
@@ -8147,7 +8319,7 @@
           <a:buFontTx/>
           <a:buNone/>
           <a:tabLst/>
-          <a:defRPr b="0" baseline="0" cap="none" i="0" spc="0" strike="noStrike" sz="1800" u="none" kumimoji="0" normalizeH="0">
+          <a:defRPr kumimoji="0" sz="1800" b="0" i="0" u="none" strike="noStrike" cap="none" spc="0" normalizeH="0" baseline="0">
             <a:ln>
               <a:noFill/>
             </a:ln>
@@ -8173,7 +8345,7 @@
           <a:buFontTx/>
           <a:buNone/>
           <a:tabLst/>
-          <a:defRPr b="0" baseline="0" cap="none" i="0" spc="0" strike="noStrike" sz="1800" u="none" kumimoji="0" normalizeH="0">
+          <a:defRPr kumimoji="0" sz="1800" b="0" i="0" u="none" strike="noStrike" cap="none" spc="0" normalizeH="0" baseline="0">
             <a:ln>
               <a:noFill/>
             </a:ln>
@@ -8199,7 +8371,7 @@
           <a:buFontTx/>
           <a:buNone/>
           <a:tabLst/>
-          <a:defRPr b="0" baseline="0" cap="none" i="0" spc="0" strike="noStrike" sz="1800" u="none" kumimoji="0" normalizeH="0">
+          <a:defRPr kumimoji="0" sz="1800" b="0" i="0" u="none" strike="noStrike" cap="none" spc="0" normalizeH="0" baseline="0">
             <a:ln>
               <a:noFill/>
             </a:ln>
@@ -8212,18 +8384,25 @@
         </a:lvl9pPr>
       </a:lstStyle>
       <a:style>
-        <a:lnRef idx="0"/>
-        <a:fillRef idx="0"/>
-        <a:effectRef idx="0"/>
+        <a:lnRef idx="0">
+          <a:scrgbClr r="0" g="0" b="0"/>
+        </a:lnRef>
+        <a:fillRef idx="0">
+          <a:scrgbClr r="0" g="0" b="0"/>
+        </a:fillRef>
+        <a:effectRef idx="0">
+          <a:scrgbClr r="0" g="0" b="0"/>
+        </a:effectRef>
         <a:fontRef idx="none"/>
       </a:style>
     </a:txDef>
   </a:objectDefaults>
+  <a:extraClrSchemeLst/>
 </a:theme>
 </file>
 
 <file path=ppt/theme/theme2.xml><?xml version="1.0" encoding="utf-8"?>
-<a:theme xmlns:a="http://schemas.openxmlformats.org/drawingml/2006/main" xmlns:r="http://schemas.openxmlformats.org/officeDocument/2006/relationships" name="Showroom">
+<a:theme xmlns:a="http://schemas.openxmlformats.org/drawingml/2006/main" name="Showroom">
   <a:themeElements>
     <a:clrScheme name="Showroom">
       <a:dk1>
@@ -8422,7 +8601,7 @@
         <a:effectLst/>
         <a:sp3d/>
       </a:spPr>
-      <a:bodyPr rot="0" spcFirstLastPara="1" vertOverflow="overflow" horzOverflow="overflow" vert="horz" wrap="square" lIns="50800" tIns="50800" rIns="50800" bIns="50800" numCol="1" spcCol="38100" rtlCol="0" anchor="ctr" upright="0">
+      <a:bodyPr rot="0" spcFirstLastPara="1" vertOverflow="overflow" horzOverflow="overflow" vert="horz" wrap="square" lIns="50800" tIns="50800" rIns="50800" bIns="50800" numCol="1" spcCol="38100" rtlCol="0" anchor="ctr">
         <a:spAutoFit/>
       </a:bodyPr>
       <a:lstStyle>
@@ -8441,7 +8620,7 @@
           <a:buFontTx/>
           <a:buNone/>
           <a:tabLst/>
-          <a:defRPr b="0" baseline="0" cap="none" i="0" spc="0" strike="noStrike" sz="5000" u="none" kumimoji="0" normalizeH="0">
+          <a:defRPr kumimoji="0" sz="5000" b="0" i="0" u="none" strike="noStrike" cap="none" spc="0" normalizeH="0" baseline="0">
             <a:ln>
               <a:noFill/>
             </a:ln>
@@ -8471,7 +8650,7 @@
           <a:buFontTx/>
           <a:buNone/>
           <a:tabLst/>
-          <a:defRPr b="0" baseline="0" cap="none" i="0" spc="0" strike="noStrike" sz="1800" u="none" kumimoji="0" normalizeH="0">
+          <a:defRPr kumimoji="0" sz="1800" b="0" i="0" u="none" strike="noStrike" cap="none" spc="0" normalizeH="0" baseline="0">
             <a:ln>
               <a:noFill/>
             </a:ln>
@@ -8497,7 +8676,7 @@
           <a:buFontTx/>
           <a:buNone/>
           <a:tabLst/>
-          <a:defRPr b="0" baseline="0" cap="none" i="0" spc="0" strike="noStrike" sz="1800" u="none" kumimoji="0" normalizeH="0">
+          <a:defRPr kumimoji="0" sz="1800" b="0" i="0" u="none" strike="noStrike" cap="none" spc="0" normalizeH="0" baseline="0">
             <a:ln>
               <a:noFill/>
             </a:ln>
@@ -8523,7 +8702,7 @@
           <a:buFontTx/>
           <a:buNone/>
           <a:tabLst/>
-          <a:defRPr b="0" baseline="0" cap="none" i="0" spc="0" strike="noStrike" sz="1800" u="none" kumimoji="0" normalizeH="0">
+          <a:defRPr kumimoji="0" sz="1800" b="0" i="0" u="none" strike="noStrike" cap="none" spc="0" normalizeH="0" baseline="0">
             <a:ln>
               <a:noFill/>
             </a:ln>
@@ -8549,7 +8728,7 @@
           <a:buFontTx/>
           <a:buNone/>
           <a:tabLst/>
-          <a:defRPr b="0" baseline="0" cap="none" i="0" spc="0" strike="noStrike" sz="1800" u="none" kumimoji="0" normalizeH="0">
+          <a:defRPr kumimoji="0" sz="1800" b="0" i="0" u="none" strike="noStrike" cap="none" spc="0" normalizeH="0" baseline="0">
             <a:ln>
               <a:noFill/>
             </a:ln>
@@ -8575,7 +8754,7 @@
           <a:buFontTx/>
           <a:buNone/>
           <a:tabLst/>
-          <a:defRPr b="0" baseline="0" cap="none" i="0" spc="0" strike="noStrike" sz="1800" u="none" kumimoji="0" normalizeH="0">
+          <a:defRPr kumimoji="0" sz="1800" b="0" i="0" u="none" strike="noStrike" cap="none" spc="0" normalizeH="0" baseline="0">
             <a:ln>
               <a:noFill/>
             </a:ln>
@@ -8601,7 +8780,7 @@
           <a:buFontTx/>
           <a:buNone/>
           <a:tabLst/>
-          <a:defRPr b="0" baseline="0" cap="none" i="0" spc="0" strike="noStrike" sz="1800" u="none" kumimoji="0" normalizeH="0">
+          <a:defRPr kumimoji="0" sz="1800" b="0" i="0" u="none" strike="noStrike" cap="none" spc="0" normalizeH="0" baseline="0">
             <a:ln>
               <a:noFill/>
             </a:ln>
@@ -8627,7 +8806,7 @@
           <a:buFontTx/>
           <a:buNone/>
           <a:tabLst/>
-          <a:defRPr b="0" baseline="0" cap="none" i="0" spc="0" strike="noStrike" sz="1800" u="none" kumimoji="0" normalizeH="0">
+          <a:defRPr kumimoji="0" sz="1800" b="0" i="0" u="none" strike="noStrike" cap="none" spc="0" normalizeH="0" baseline="0">
             <a:ln>
               <a:noFill/>
             </a:ln>
@@ -8653,7 +8832,7 @@
           <a:buFontTx/>
           <a:buNone/>
           <a:tabLst/>
-          <a:defRPr b="0" baseline="0" cap="none" i="0" spc="0" strike="noStrike" sz="1800" u="none" kumimoji="0" normalizeH="0">
+          <a:defRPr kumimoji="0" sz="1800" b="0" i="0" u="none" strike="noStrike" cap="none" spc="0" normalizeH="0" baseline="0">
             <a:ln>
               <a:noFill/>
             </a:ln>
@@ -8679,7 +8858,7 @@
           <a:buFontTx/>
           <a:buNone/>
           <a:tabLst/>
-          <a:defRPr b="0" baseline="0" cap="none" i="0" spc="0" strike="noStrike" sz="1800" u="none" kumimoji="0" normalizeH="0">
+          <a:defRPr kumimoji="0" sz="1800" b="0" i="0" u="none" strike="noStrike" cap="none" spc="0" normalizeH="0" baseline="0">
             <a:ln>
               <a:noFill/>
             </a:ln>
@@ -8692,9 +8871,15 @@
         </a:lvl9pPr>
       </a:lstStyle>
       <a:style>
-        <a:lnRef idx="0"/>
-        <a:fillRef idx="0"/>
-        <a:effectRef idx="0"/>
+        <a:lnRef idx="0">
+          <a:scrgbClr r="0" g="0" b="0"/>
+        </a:lnRef>
+        <a:fillRef idx="0">
+          <a:scrgbClr r="0" g="0" b="0"/>
+        </a:fillRef>
+        <a:effectRef idx="0">
+          <a:scrgbClr r="0" g="0" b="0"/>
+        </a:effectRef>
         <a:fontRef idx="none"/>
       </a:style>
     </a:spDef>
@@ -8711,7 +8896,7 @@
         <a:effectLst/>
         <a:sp3d/>
       </a:spPr>
-      <a:bodyPr rot="0" spcFirstLastPara="1" vertOverflow="overflow" horzOverflow="overflow" vert="horz" wrap="square" lIns="91439" tIns="45719" rIns="91439" bIns="45719" numCol="1" spcCol="38100" rtlCol="0" anchor="t" upright="0">
+      <a:bodyPr rot="0" spcFirstLastPara="1" vertOverflow="overflow" horzOverflow="overflow" vert="horz" wrap="square" lIns="91439" tIns="45719" rIns="91439" bIns="45719" numCol="1" spcCol="38100" rtlCol="0" anchor="t">
         <a:noAutofit/>
       </a:bodyPr>
       <a:lstStyle>
@@ -8730,7 +8915,7 @@
           <a:buFontTx/>
           <a:buNone/>
           <a:tabLst/>
-          <a:defRPr b="0" baseline="0" cap="none" i="0" spc="0" strike="noStrike" sz="1800" u="none" kumimoji="0" normalizeH="0">
+          <a:defRPr kumimoji="0" sz="1800" b="0" i="0" u="none" strike="noStrike" cap="none" spc="0" normalizeH="0" baseline="0">
             <a:ln>
               <a:noFill/>
             </a:ln>
@@ -8756,7 +8941,7 @@
           <a:buFontTx/>
           <a:buNone/>
           <a:tabLst/>
-          <a:defRPr b="0" baseline="0" cap="none" i="0" spc="0" strike="noStrike" sz="1800" u="none" kumimoji="0" normalizeH="0">
+          <a:defRPr kumimoji="0" sz="1800" b="0" i="0" u="none" strike="noStrike" cap="none" spc="0" normalizeH="0" baseline="0">
             <a:ln>
               <a:noFill/>
             </a:ln>
@@ -8782,7 +8967,7 @@
           <a:buFontTx/>
           <a:buNone/>
           <a:tabLst/>
-          <a:defRPr b="0" baseline="0" cap="none" i="0" spc="0" strike="noStrike" sz="1800" u="none" kumimoji="0" normalizeH="0">
+          <a:defRPr kumimoji="0" sz="1800" b="0" i="0" u="none" strike="noStrike" cap="none" spc="0" normalizeH="0" baseline="0">
             <a:ln>
               <a:noFill/>
             </a:ln>
@@ -8808,7 +8993,7 @@
           <a:buFontTx/>
           <a:buNone/>
           <a:tabLst/>
-          <a:defRPr b="0" baseline="0" cap="none" i="0" spc="0" strike="noStrike" sz="1800" u="none" kumimoji="0" normalizeH="0">
+          <a:defRPr kumimoji="0" sz="1800" b="0" i="0" u="none" strike="noStrike" cap="none" spc="0" normalizeH="0" baseline="0">
             <a:ln>
               <a:noFill/>
             </a:ln>
@@ -8834,7 +9019,7 @@
           <a:buFontTx/>
           <a:buNone/>
           <a:tabLst/>
-          <a:defRPr b="0" baseline="0" cap="none" i="0" spc="0" strike="noStrike" sz="1800" u="none" kumimoji="0" normalizeH="0">
+          <a:defRPr kumimoji="0" sz="1800" b="0" i="0" u="none" strike="noStrike" cap="none" spc="0" normalizeH="0" baseline="0">
             <a:ln>
               <a:noFill/>
             </a:ln>
@@ -8860,7 +9045,7 @@
           <a:buFontTx/>
           <a:buNone/>
           <a:tabLst/>
-          <a:defRPr b="0" baseline="0" cap="none" i="0" spc="0" strike="noStrike" sz="1800" u="none" kumimoji="0" normalizeH="0">
+          <a:defRPr kumimoji="0" sz="1800" b="0" i="0" u="none" strike="noStrike" cap="none" spc="0" normalizeH="0" baseline="0">
             <a:ln>
               <a:noFill/>
             </a:ln>
@@ -8886,7 +9071,7 @@
           <a:buFontTx/>
           <a:buNone/>
           <a:tabLst/>
-          <a:defRPr b="0" baseline="0" cap="none" i="0" spc="0" strike="noStrike" sz="1800" u="none" kumimoji="0" normalizeH="0">
+          <a:defRPr kumimoji="0" sz="1800" b="0" i="0" u="none" strike="noStrike" cap="none" spc="0" normalizeH="0" baseline="0">
             <a:ln>
               <a:noFill/>
             </a:ln>
@@ -8912,7 +9097,7 @@
           <a:buFontTx/>
           <a:buNone/>
           <a:tabLst/>
-          <a:defRPr b="0" baseline="0" cap="none" i="0" spc="0" strike="noStrike" sz="1800" u="none" kumimoji="0" normalizeH="0">
+          <a:defRPr kumimoji="0" sz="1800" b="0" i="0" u="none" strike="noStrike" cap="none" spc="0" normalizeH="0" baseline="0">
             <a:ln>
               <a:noFill/>
             </a:ln>
@@ -8938,7 +9123,7 @@
           <a:buFontTx/>
           <a:buNone/>
           <a:tabLst/>
-          <a:defRPr b="0" baseline="0" cap="none" i="0" spc="0" strike="noStrike" sz="1800" u="none" kumimoji="0" normalizeH="0">
+          <a:defRPr kumimoji="0" sz="1800" b="0" i="0" u="none" strike="noStrike" cap="none" spc="0" normalizeH="0" baseline="0">
             <a:ln>
               <a:noFill/>
             </a:ln>
@@ -8964,7 +9149,7 @@
           <a:buFontTx/>
           <a:buNone/>
           <a:tabLst/>
-          <a:defRPr b="0" baseline="0" cap="none" i="0" spc="0" strike="noStrike" sz="1800" u="none" kumimoji="0" normalizeH="0">
+          <a:defRPr kumimoji="0" sz="1800" b="0" i="0" u="none" strike="noStrike" cap="none" spc="0" normalizeH="0" baseline="0">
             <a:ln>
               <a:noFill/>
             </a:ln>
@@ -8977,9 +9162,15 @@
         </a:lvl9pPr>
       </a:lstStyle>
       <a:style>
-        <a:lnRef idx="0"/>
-        <a:fillRef idx="0"/>
-        <a:effectRef idx="0"/>
+        <a:lnRef idx="0">
+          <a:scrgbClr r="0" g="0" b="0"/>
+        </a:lnRef>
+        <a:fillRef idx="0">
+          <a:scrgbClr r="0" g="0" b="0"/>
+        </a:fillRef>
+        <a:effectRef idx="0">
+          <a:scrgbClr r="0" g="0" b="0"/>
+        </a:effectRef>
         <a:fontRef idx="none"/>
       </a:style>
     </a:lnDef>
@@ -8993,7 +9184,7 @@
         <a:effectLst/>
         <a:sp3d/>
       </a:spPr>
-      <a:bodyPr rot="0" spcFirstLastPara="1" vertOverflow="overflow" horzOverflow="overflow" vert="horz" wrap="square" lIns="50800" tIns="50800" rIns="50800" bIns="50800" numCol="1" spcCol="38100" rtlCol="0" anchor="ctr" upright="0">
+      <a:bodyPr rot="0" spcFirstLastPara="1" vertOverflow="overflow" horzOverflow="overflow" vert="horz" wrap="square" lIns="50800" tIns="50800" rIns="50800" bIns="50800" numCol="1" spcCol="38100" rtlCol="0" anchor="ctr">
         <a:spAutoFit/>
       </a:bodyPr>
       <a:lstStyle>
@@ -9012,7 +9203,7 @@
           <a:buFontTx/>
           <a:buNone/>
           <a:tabLst/>
-          <a:defRPr b="0" baseline="0" cap="none" i="0" spc="0" strike="noStrike" sz="5000" u="none" kumimoji="0" normalizeH="0">
+          <a:defRPr kumimoji="0" sz="5000" b="0" i="0" u="none" strike="noStrike" cap="none" spc="0" normalizeH="0" baseline="0">
             <a:ln>
               <a:noFill/>
             </a:ln>
@@ -9042,7 +9233,7 @@
           <a:buFontTx/>
           <a:buNone/>
           <a:tabLst/>
-          <a:defRPr b="0" baseline="0" cap="none" i="0" spc="0" strike="noStrike" sz="1800" u="none" kumimoji="0" normalizeH="0">
+          <a:defRPr kumimoji="0" sz="1800" b="0" i="0" u="none" strike="noStrike" cap="none" spc="0" normalizeH="0" baseline="0">
             <a:ln>
               <a:noFill/>
             </a:ln>
@@ -9068,7 +9259,7 @@
           <a:buFontTx/>
           <a:buNone/>
           <a:tabLst/>
-          <a:defRPr b="0" baseline="0" cap="none" i="0" spc="0" strike="noStrike" sz="1800" u="none" kumimoji="0" normalizeH="0">
+          <a:defRPr kumimoji="0" sz="1800" b="0" i="0" u="none" strike="noStrike" cap="none" spc="0" normalizeH="0" baseline="0">
             <a:ln>
               <a:noFill/>
             </a:ln>
@@ -9094,7 +9285,7 @@
           <a:buFontTx/>
           <a:buNone/>
           <a:tabLst/>
-          <a:defRPr b="0" baseline="0" cap="none" i="0" spc="0" strike="noStrike" sz="1800" u="none" kumimoji="0" normalizeH="0">
+          <a:defRPr kumimoji="0" sz="1800" b="0" i="0" u="none" strike="noStrike" cap="none" spc="0" normalizeH="0" baseline="0">
             <a:ln>
               <a:noFill/>
             </a:ln>
@@ -9120,7 +9311,7 @@
           <a:buFontTx/>
           <a:buNone/>
           <a:tabLst/>
-          <a:defRPr b="0" baseline="0" cap="none" i="0" spc="0" strike="noStrike" sz="1800" u="none" kumimoji="0" normalizeH="0">
+          <a:defRPr kumimoji="0" sz="1800" b="0" i="0" u="none" strike="noStrike" cap="none" spc="0" normalizeH="0" baseline="0">
             <a:ln>
               <a:noFill/>
             </a:ln>
@@ -9146,7 +9337,7 @@
           <a:buFontTx/>
           <a:buNone/>
           <a:tabLst/>
-          <a:defRPr b="0" baseline="0" cap="none" i="0" spc="0" strike="noStrike" sz="1800" u="none" kumimoji="0" normalizeH="0">
+          <a:defRPr kumimoji="0" sz="1800" b="0" i="0" u="none" strike="noStrike" cap="none" spc="0" normalizeH="0" baseline="0">
             <a:ln>
               <a:noFill/>
             </a:ln>
@@ -9172,7 +9363,7 @@
           <a:buFontTx/>
           <a:buNone/>
           <a:tabLst/>
-          <a:defRPr b="0" baseline="0" cap="none" i="0" spc="0" strike="noStrike" sz="1800" u="none" kumimoji="0" normalizeH="0">
+          <a:defRPr kumimoji="0" sz="1800" b="0" i="0" u="none" strike="noStrike" cap="none" spc="0" normalizeH="0" baseline="0">
             <a:ln>
               <a:noFill/>
             </a:ln>
@@ -9198,7 +9389,7 @@
           <a:buFontTx/>
           <a:buNone/>
           <a:tabLst/>
-          <a:defRPr b="0" baseline="0" cap="none" i="0" spc="0" strike="noStrike" sz="1800" u="none" kumimoji="0" normalizeH="0">
+          <a:defRPr kumimoji="0" sz="1800" b="0" i="0" u="none" strike="noStrike" cap="none" spc="0" normalizeH="0" baseline="0">
             <a:ln>
               <a:noFill/>
             </a:ln>
@@ -9224,7 +9415,7 @@
           <a:buFontTx/>
           <a:buNone/>
           <a:tabLst/>
-          <a:defRPr b="0" baseline="0" cap="none" i="0" spc="0" strike="noStrike" sz="1800" u="none" kumimoji="0" normalizeH="0">
+          <a:defRPr kumimoji="0" sz="1800" b="0" i="0" u="none" strike="noStrike" cap="none" spc="0" normalizeH="0" baseline="0">
             <a:ln>
               <a:noFill/>
             </a:ln>
@@ -9250,7 +9441,7 @@
           <a:buFontTx/>
           <a:buNone/>
           <a:tabLst/>
-          <a:defRPr b="0" baseline="0" cap="none" i="0" spc="0" strike="noStrike" sz="1800" u="none" kumimoji="0" normalizeH="0">
+          <a:defRPr kumimoji="0" sz="1800" b="0" i="0" u="none" strike="noStrike" cap="none" spc="0" normalizeH="0" baseline="0">
             <a:ln>
               <a:noFill/>
             </a:ln>
@@ -9263,12 +9454,19 @@
         </a:lvl9pPr>
       </a:lstStyle>
       <a:style>
-        <a:lnRef idx="0"/>
-        <a:fillRef idx="0"/>
-        <a:effectRef idx="0"/>
+        <a:lnRef idx="0">
+          <a:scrgbClr r="0" g="0" b="0"/>
+        </a:lnRef>
+        <a:fillRef idx="0">
+          <a:scrgbClr r="0" g="0" b="0"/>
+        </a:fillRef>
+        <a:effectRef idx="0">
+          <a:scrgbClr r="0" g="0" b="0"/>
+        </a:effectRef>
         <a:fontRef idx="none"/>
       </a:style>
     </a:txDef>
   </a:objectDefaults>
+  <a:extraClrSchemeLst/>
 </a:theme>
 </file>
</xml_diff>